<commit_message>
Added command category slide
</commit_message>
<xml_diff>
--- a/evidence.pptx
+++ b/evidence.pptx
@@ -7,7 +7,8 @@
   <p:sldIdLst>
     <p:sldId id="256" r:id="rId2"/>
     <p:sldId id="257" r:id="rId3"/>
-    <p:sldId id="258" r:id="rId4"/>
+    <p:sldId id="259" r:id="rId4"/>
+    <p:sldId id="258" r:id="rId5"/>
   </p:sldIdLst>
   <p:sldSz cx="12192000" cy="6858000"/>
   <p:notesSz cx="6858000" cy="9144000"/>
@@ -3475,119 +3476,423 @@
           </a:p>
         </p:txBody>
       </p:sp>
-      <p:sp>
-        <p:nvSpPr>
-          <p:cNvPr id="3" name="Content Placeholder 2">
-            <a:extLst>
-              <a:ext uri="{FF2B5EF4-FFF2-40B4-BE49-F238E27FC236}">
-                <a16:creationId xmlns:a16="http://schemas.microsoft.com/office/drawing/2014/main" id="{276EEB0A-3C82-9659-FDAB-F7AF31A7CEA9}"/>
-              </a:ext>
-            </a:extLst>
-          </p:cNvPr>
-          <p:cNvSpPr>
-            <a:spLocks noGrp="1"/>
-          </p:cNvSpPr>
-          <p:nvPr>
-            <p:ph idx="1"/>
-          </p:nvPr>
-        </p:nvSpPr>
-        <p:spPr/>
-        <p:txBody>
-          <a:bodyPr>
-            <a:normAutofit/>
+      <p:graphicFrame>
+        <p:nvGraphicFramePr>
+          <p:cNvPr id="4" name="Table 4">
+            <a:extLst>
+              <a:ext uri="{FF2B5EF4-FFF2-40B4-BE49-F238E27FC236}">
+                <a16:creationId xmlns:a16="http://schemas.microsoft.com/office/drawing/2014/main" id="{11ABF2B1-7C6F-3A53-CF7A-C2D178ABA4AE}"/>
+              </a:ext>
+            </a:extLst>
+          </p:cNvPr>
+          <p:cNvGraphicFramePr>
+            <a:graphicFrameLocks noGrp="1"/>
+          </p:cNvGraphicFramePr>
+          <p:nvPr>
+            <p:extLst>
+              <p:ext uri="{D42A27DB-BD31-4B8C-83A1-F6EECF244321}">
+                <p14:modId xmlns:p14="http://schemas.microsoft.com/office/powerpoint/2010/main" val="3837343450"/>
+              </p:ext>
+            </p:extLst>
+          </p:nvPr>
+        </p:nvGraphicFramePr>
+        <p:xfrm>
+          <a:off x="647700" y="1328738"/>
+          <a:ext cx="11125200" cy="4038600"/>
+        </p:xfrm>
+        <a:graphic>
+          <a:graphicData uri="http://schemas.openxmlformats.org/drawingml/2006/table">
+            <a:tbl>
+              <a:tblPr firstRow="1" bandRow="1">
+                <a:tableStyleId>{5C22544A-7EE6-4342-B048-85BDC9FD1C3A}</a:tableStyleId>
+              </a:tblPr>
+              <a:tblGrid>
+                <a:gridCol w="3708400">
+                  <a:extLst>
+                    <a:ext uri="{9D8B030D-6E8A-4147-A177-3AD203B41FA5}">
+                      <a16:colId xmlns:a16="http://schemas.microsoft.com/office/drawing/2014/main" val="3320604885"/>
+                    </a:ext>
+                  </a:extLst>
+                </a:gridCol>
+                <a:gridCol w="3543300">
+                  <a:extLst>
+                    <a:ext uri="{9D8B030D-6E8A-4147-A177-3AD203B41FA5}">
+                      <a16:colId xmlns:a16="http://schemas.microsoft.com/office/drawing/2014/main" val="2877726149"/>
+                    </a:ext>
+                  </a:extLst>
+                </a:gridCol>
+                <a:gridCol w="3873500">
+                  <a:extLst>
+                    <a:ext uri="{9D8B030D-6E8A-4147-A177-3AD203B41FA5}">
+                      <a16:colId xmlns:a16="http://schemas.microsoft.com/office/drawing/2014/main" val="3357257556"/>
+                    </a:ext>
+                  </a:extLst>
+                </a:gridCol>
+              </a:tblGrid>
+              <a:tr h="370840">
+                <a:tc>
+                  <a:txBody>
+                    <a:bodyPr/>
+                    <a:lstStyle/>
+                    <a:p>
+                      <a:r>
+                        <a:rPr lang="en-AU" dirty="0"/>
+                        <a:t>Category</a:t>
+                      </a:r>
+                    </a:p>
+                  </a:txBody>
+                  <a:tcPr/>
+                </a:tc>
+                <a:tc>
+                  <a:txBody>
+                    <a:bodyPr/>
+                    <a:lstStyle/>
+                    <a:p>
+                      <a:r>
+                        <a:rPr lang="en-AU" dirty="0"/>
+                        <a:t>Category Description</a:t>
+                      </a:r>
+                    </a:p>
+                  </a:txBody>
+                  <a:tcPr/>
+                </a:tc>
+                <a:tc>
+                  <a:txBody>
+                    <a:bodyPr/>
+                    <a:lstStyle/>
+                    <a:p>
+                      <a:r>
+                        <a:rPr lang="en-AU" dirty="0"/>
+                        <a:t>Description</a:t>
+                      </a:r>
+                    </a:p>
+                  </a:txBody>
+                  <a:tcPr/>
+                </a:tc>
+                <a:extLst>
+                  <a:ext uri="{0D108BD9-81ED-4DB2-BD59-A6C34878D82A}">
+                    <a16:rowId xmlns:a16="http://schemas.microsoft.com/office/drawing/2014/main" val="3923147600"/>
+                  </a:ext>
+                </a:extLst>
+              </a:tr>
+              <a:tr h="370840">
+                <a:tc>
+                  <a:txBody>
+                    <a:bodyPr/>
+                    <a:lstStyle/>
+                    <a:p>
+                      <a:r>
+                        <a:rPr lang="en-AU" sz="1800" dirty="0">
+                          <a:hlinkClick r:id="rId2"/>
+                        </a:rPr>
+                        <a:t>T1033</a:t>
+                      </a:r>
+                      <a:endParaRPr lang="en-AU" dirty="0"/>
+                    </a:p>
+                  </a:txBody>
+                  <a:tcPr/>
+                </a:tc>
+                <a:tc>
+                  <a:txBody>
+                    <a:bodyPr/>
+                    <a:lstStyle/>
+                    <a:p>
+                      <a:r>
+                        <a:rPr lang="en-AU" dirty="0"/>
+                        <a:t> System Owner/User Discovery </a:t>
+                      </a:r>
+                    </a:p>
+                  </a:txBody>
+                  <a:tcPr/>
+                </a:tc>
+                <a:tc>
+                  <a:txBody>
+                    <a:bodyPr/>
+                    <a:lstStyle/>
+                    <a:p>
+                      <a:r>
+                        <a:rPr lang="en-GB" sz="1800" b="1" dirty="0"/>
+                        <a:t>Net Use </a:t>
+                      </a:r>
+                      <a:r>
+                        <a:rPr lang="en-GB" sz="1800" dirty="0"/>
+                        <a:t>to connect to other computers</a:t>
+                      </a:r>
+                      <a:endParaRPr lang="en-AU" dirty="0"/>
+                    </a:p>
+                  </a:txBody>
+                  <a:tcPr/>
+                </a:tc>
+                <a:extLst>
+                  <a:ext uri="{0D108BD9-81ED-4DB2-BD59-A6C34878D82A}">
+                    <a16:rowId xmlns:a16="http://schemas.microsoft.com/office/drawing/2014/main" val="972132094"/>
+                  </a:ext>
+                </a:extLst>
+              </a:tr>
+              <a:tr h="370840">
+                <a:tc>
+                  <a:txBody>
+                    <a:bodyPr/>
+                    <a:lstStyle/>
+                    <a:p>
+                      <a:r>
+                        <a:rPr lang="en-AU" sz="1800" dirty="0">
+                          <a:hlinkClick r:id="rId3"/>
+                        </a:rPr>
+                        <a:t>T1570</a:t>
+                      </a:r>
+                      <a:endParaRPr lang="en-AU" dirty="0"/>
+                    </a:p>
+                  </a:txBody>
+                  <a:tcPr/>
+                </a:tc>
+                <a:tc>
+                  <a:txBody>
+                    <a:bodyPr/>
+                    <a:lstStyle/>
+                    <a:p>
+                      <a:r>
+                        <a:rPr lang="en-AU" dirty="0"/>
+                        <a:t> Lateral Tool Transfer </a:t>
+                      </a:r>
+                    </a:p>
+                  </a:txBody>
+                  <a:tcPr/>
+                </a:tc>
+                <a:tc>
+                  <a:txBody>
+                    <a:bodyPr/>
+                    <a:lstStyle/>
+                    <a:p>
+                      <a:r>
+                        <a:rPr lang="en-GB" sz="1800" b="1" dirty="0" err="1"/>
+                        <a:t>PsExec</a:t>
+                      </a:r>
+                      <a:r>
+                        <a:rPr lang="en-GB" sz="1800" dirty="0"/>
+                        <a:t> to deploy payloads to computer</a:t>
+                      </a:r>
+                      <a:endParaRPr lang="en-AU" dirty="0"/>
+                    </a:p>
+                  </a:txBody>
+                  <a:tcPr/>
+                </a:tc>
+                <a:extLst>
+                  <a:ext uri="{0D108BD9-81ED-4DB2-BD59-A6C34878D82A}">
+                    <a16:rowId xmlns:a16="http://schemas.microsoft.com/office/drawing/2014/main" val="2415464425"/>
+                  </a:ext>
+                </a:extLst>
+              </a:tr>
+              <a:tr h="370840">
+                <a:tc>
+                  <a:txBody>
+                    <a:bodyPr/>
+                    <a:lstStyle/>
+                    <a:p>
+                      <a:r>
+                        <a:rPr lang="en-AU" sz="1800" dirty="0">
+                          <a:hlinkClick r:id="rId4"/>
+                        </a:rPr>
+                        <a:t>T1059</a:t>
+                      </a:r>
+                      <a:endParaRPr lang="en-AU" dirty="0"/>
+                    </a:p>
+                  </a:txBody>
+                  <a:tcPr/>
+                </a:tc>
+                <a:tc>
+                  <a:txBody>
+                    <a:bodyPr/>
+                    <a:lstStyle/>
+                    <a:p>
+                      <a:r>
+                        <a:rPr lang="en-AU" dirty="0"/>
+                        <a:t> Command and Scripting Interpreter </a:t>
+                      </a:r>
+                    </a:p>
+                  </a:txBody>
+                  <a:tcPr/>
+                </a:tc>
+                <a:tc>
+                  <a:txBody>
+                    <a:bodyPr/>
+                    <a:lstStyle/>
+                    <a:p>
+                      <a:r>
+                        <a:rPr lang="en-GB" sz="1800" dirty="0"/>
+                        <a:t>can execute commands on a compromised network with the use of </a:t>
+                      </a:r>
+                      <a:r>
+                        <a:rPr lang="en-GB" sz="1800" b="1" dirty="0"/>
+                        <a:t>cmd.exe</a:t>
+                      </a:r>
+                      <a:endParaRPr lang="en-AU" b="1" dirty="0"/>
+                    </a:p>
+                  </a:txBody>
+                  <a:tcPr/>
+                </a:tc>
+                <a:extLst>
+                  <a:ext uri="{0D108BD9-81ED-4DB2-BD59-A6C34878D82A}">
+                    <a16:rowId xmlns:a16="http://schemas.microsoft.com/office/drawing/2014/main" val="3751381801"/>
+                  </a:ext>
+                </a:extLst>
+              </a:tr>
+              <a:tr h="370840">
+                <a:tc>
+                  <a:txBody>
+                    <a:bodyPr/>
+                    <a:lstStyle/>
+                    <a:p>
+                      <a:r>
+                        <a:rPr lang="en-AU" sz="1800" dirty="0">
+                          <a:hlinkClick r:id="rId5"/>
+                        </a:rPr>
+                        <a:t>T1490</a:t>
+                      </a:r>
+                      <a:endParaRPr lang="en-AU" dirty="0"/>
+                    </a:p>
+                  </a:txBody>
+                  <a:tcPr/>
+                </a:tc>
+                <a:tc>
+                  <a:txBody>
+                    <a:bodyPr/>
+                    <a:lstStyle/>
+                    <a:p>
+                      <a:r>
+                        <a:rPr lang="en-AU" dirty="0"/>
+                        <a:t> Inhibit System Recovery </a:t>
+                      </a:r>
+                    </a:p>
+                  </a:txBody>
+                  <a:tcPr/>
+                </a:tc>
+                <a:tc>
+                  <a:txBody>
+                    <a:bodyPr/>
+                    <a:lstStyle/>
+                    <a:p>
+                      <a:pPr marL="0" marR="0" lvl="0" indent="0" algn="l" defTabSz="914400" rtl="0" eaLnBrk="1" fontAlgn="auto" latinLnBrk="0" hangingPunct="1">
+                        <a:lnSpc>
+                          <a:spcPct val="100000"/>
+                        </a:lnSpc>
+                        <a:spcBef>
+                          <a:spcPts val="0"/>
+                        </a:spcBef>
+                        <a:spcAft>
+                          <a:spcPts val="0"/>
+                        </a:spcAft>
+                        <a:buClrTx/>
+                        <a:buSzTx/>
+                        <a:buFontTx/>
+                        <a:buNone/>
+                        <a:tabLst/>
+                        <a:defRPr/>
+                      </a:pPr>
+                      <a:r>
+                        <a:rPr lang="en-AU" sz="1800" dirty="0"/>
+                        <a:t>can delete shadow copies using </a:t>
+                      </a:r>
+                      <a:r>
+                        <a:rPr lang="en-AU" sz="1800" b="1" dirty="0"/>
+                        <a:t>vssadmin.exe delete shadows /all /quiet </a:t>
+                      </a:r>
+                      <a:r>
+                        <a:rPr lang="en-AU" sz="1800" dirty="0"/>
+                        <a:t>and </a:t>
+                      </a:r>
+                      <a:r>
+                        <a:rPr lang="en-AU" sz="1800" b="1" dirty="0"/>
+                        <a:t>wmic.exe </a:t>
+                      </a:r>
+                      <a:r>
+                        <a:rPr lang="en-AU" sz="1800" b="1" dirty="0" err="1"/>
+                        <a:t>Shadowcopy</a:t>
+                      </a:r>
+                      <a:r>
+                        <a:rPr lang="en-AU" sz="1800" b="1" dirty="0"/>
+                        <a:t> Delete; </a:t>
+                      </a:r>
+                      <a:r>
+                        <a:rPr lang="en-AU" sz="1800" dirty="0"/>
+                        <a:t>it can also modify the boot loader using </a:t>
+                      </a:r>
+                      <a:r>
+                        <a:rPr lang="en-AU" sz="1800" b="1" dirty="0" err="1"/>
+                        <a:t>bcdedit</a:t>
+                      </a:r>
+                      <a:r>
+                        <a:rPr lang="en-AU" sz="1800" b="1" dirty="0"/>
+                        <a:t> /set {default} </a:t>
+                      </a:r>
+                      <a:r>
+                        <a:rPr lang="en-AU" sz="1800" b="1" dirty="0" err="1"/>
+                        <a:t>recoveryenabled</a:t>
+                      </a:r>
+                      <a:r>
+                        <a:rPr lang="en-AU" sz="1800" b="1" dirty="0"/>
+                        <a:t> No</a:t>
+                      </a:r>
+                      <a:endParaRPr lang="en-GB" sz="1800" b="1" dirty="0"/>
+                    </a:p>
+                    <a:p>
+                      <a:endParaRPr lang="en-AU" dirty="0"/>
+                    </a:p>
+                  </a:txBody>
+                  <a:tcPr/>
+                </a:tc>
+                <a:extLst>
+                  <a:ext uri="{0D108BD9-81ED-4DB2-BD59-A6C34878D82A}">
+                    <a16:rowId xmlns:a16="http://schemas.microsoft.com/office/drawing/2014/main" val="3220529917"/>
+                  </a:ext>
+                </a:extLst>
+              </a:tr>
+            </a:tbl>
+          </a:graphicData>
+        </a:graphic>
+      </p:graphicFrame>
+      <p:sp>
+        <p:nvSpPr>
+          <p:cNvPr id="5" name="TextBox 4">
+            <a:extLst>
+              <a:ext uri="{FF2B5EF4-FFF2-40B4-BE49-F238E27FC236}">
+                <a16:creationId xmlns:a16="http://schemas.microsoft.com/office/drawing/2014/main" id="{73E7FCC8-F8DC-ADC9-7670-941264761717}"/>
+              </a:ext>
+            </a:extLst>
+          </p:cNvPr>
+          <p:cNvSpPr txBox="1"/>
+          <p:nvPr/>
+        </p:nvSpPr>
+        <p:spPr>
+          <a:xfrm>
+            <a:off x="3155950" y="5424488"/>
+            <a:ext cx="8128000" cy="369332"/>
+          </a:xfrm>
+          <a:prstGeom prst="rect">
+            <a:avLst/>
+          </a:prstGeom>
+          <a:noFill/>
+        </p:spPr>
+        <p:txBody>
+          <a:bodyPr wrap="square" rtlCol="0">
+            <a:spAutoFit/>
           </a:bodyPr>
           <a:lstStyle/>
           <a:p>
             <a:r>
-              <a:rPr lang="en-AU" sz="1600" dirty="0">
-                <a:hlinkClick r:id="rId2"/>
+              <a:rPr lang="en-AU" dirty="0"/>
+              <a:t>All command categories came from </a:t>
+            </a:r>
+            <a:r>
+              <a:rPr lang="en-AU" dirty="0">
+                <a:hlinkClick r:id="rId6" action="ppaction://hlinkfile"/>
               </a:rPr>
-              <a:t>T1033</a:t>
-            </a:r>
-            <a:r>
-              <a:rPr lang="en-AU" sz="1600" dirty="0"/>
-              <a:t> </a:t>
-            </a:r>
-            <a:r>
-              <a:rPr lang="en-GB" sz="1600" dirty="0"/>
-              <a:t>Net Use to connect to other computers</a:t>
-            </a:r>
-          </a:p>
-          <a:p>
-            <a:r>
-              <a:rPr lang="en-AU" sz="1600" dirty="0">
-                <a:hlinkClick r:id="rId3"/>
-              </a:rPr>
-              <a:t>T1570</a:t>
-            </a:r>
-            <a:r>
-              <a:rPr lang="en-AU" sz="1600" dirty="0"/>
-              <a:t> </a:t>
-            </a:r>
-            <a:r>
-              <a:rPr lang="en-GB" sz="1600" dirty="0" err="1"/>
-              <a:t>PsExec</a:t>
-            </a:r>
-            <a:r>
-              <a:rPr lang="en-GB" sz="1600" dirty="0"/>
-              <a:t> to deploy payloads to computer</a:t>
-            </a:r>
-          </a:p>
-          <a:p>
-            <a:r>
-              <a:rPr lang="en-AU" sz="1600" dirty="0">
-                <a:hlinkClick r:id="rId4"/>
-              </a:rPr>
-              <a:t>T1059</a:t>
-            </a:r>
-            <a:r>
-              <a:rPr lang="en-AU" sz="1600" dirty="0"/>
-              <a:t> </a:t>
-            </a:r>
-            <a:r>
-              <a:rPr lang="en-GB" sz="1600" dirty="0"/>
-              <a:t>can execute commands on a compromised network with the use of cmd.exe</a:t>
-            </a:r>
-          </a:p>
-          <a:p>
-            <a:r>
-              <a:rPr lang="en-AU" sz="1600" dirty="0">
-                <a:hlinkClick r:id="rId5"/>
-              </a:rPr>
-              <a:t>T1490</a:t>
-            </a:r>
-            <a:r>
-              <a:rPr lang="en-AU" sz="1600" dirty="0"/>
-              <a:t> can delete shadow copies using vssadmin.exe delete shadows /all /quiet and wmic.exe </a:t>
-            </a:r>
-            <a:r>
-              <a:rPr lang="en-AU" sz="1600" dirty="0" err="1"/>
-              <a:t>Shadowcopy</a:t>
-            </a:r>
-            <a:r>
-              <a:rPr lang="en-AU" sz="1600" dirty="0"/>
-              <a:t> Delete; it can also modify the boot loader using </a:t>
-            </a:r>
-            <a:r>
-              <a:rPr lang="en-AU" sz="1600" dirty="0" err="1"/>
-              <a:t>bcdedit</a:t>
-            </a:r>
-            <a:r>
-              <a:rPr lang="en-AU" sz="1600" dirty="0"/>
-              <a:t> /set {default} </a:t>
-            </a:r>
-            <a:r>
-              <a:rPr lang="en-AU" sz="1600" dirty="0" err="1"/>
-              <a:t>recoveryenabled</a:t>
-            </a:r>
-            <a:r>
-              <a:rPr lang="en-AU" sz="1600" dirty="0"/>
-              <a:t> No</a:t>
-            </a:r>
-            <a:endParaRPr lang="en-GB" sz="1600" dirty="0"/>
-          </a:p>
-          <a:p>
-            <a:endParaRPr lang="en-AU" sz="1600" dirty="0"/>
+              <a:t>attack.mitre.org </a:t>
+            </a:r>
+            <a:r>
+              <a:rPr lang="en-AU" dirty="0"/>
+              <a:t>group.</a:t>
+            </a:r>
           </a:p>
         </p:txBody>
       </p:sp>
@@ -3605,6 +3910,89 @@
 </file>
 
 <file path=ppt/slides/slide3.xml><?xml version="1.0" encoding="utf-8"?>
+<p:sld xmlns:a="http://schemas.openxmlformats.org/drawingml/2006/main" xmlns:r="http://schemas.openxmlformats.org/officeDocument/2006/relationships" xmlns:p="http://schemas.openxmlformats.org/presentationml/2006/main">
+  <p:cSld>
+    <p:spTree>
+      <p:nvGrpSpPr>
+        <p:cNvPr id="1" name=""/>
+        <p:cNvGrpSpPr/>
+        <p:nvPr/>
+      </p:nvGrpSpPr>
+      <p:grpSpPr>
+        <a:xfrm>
+          <a:off x="0" y="0"/>
+          <a:ext cx="0" cy="0"/>
+          <a:chOff x="0" y="0"/>
+          <a:chExt cx="0" cy="0"/>
+        </a:xfrm>
+      </p:grpSpPr>
+      <p:sp>
+        <p:nvSpPr>
+          <p:cNvPr id="2" name="Title 1">
+            <a:extLst>
+              <a:ext uri="{FF2B5EF4-FFF2-40B4-BE49-F238E27FC236}">
+                <a16:creationId xmlns:a16="http://schemas.microsoft.com/office/drawing/2014/main" id="{3E36DABE-3348-504E-ACEF-16D78EB496EF}"/>
+              </a:ext>
+            </a:extLst>
+          </p:cNvPr>
+          <p:cNvSpPr>
+            <a:spLocks noGrp="1"/>
+          </p:cNvSpPr>
+          <p:nvPr>
+            <p:ph type="title"/>
+          </p:nvPr>
+        </p:nvSpPr>
+        <p:spPr/>
+        <p:txBody>
+          <a:bodyPr/>
+          <a:lstStyle/>
+          <a:p>
+            <a:r>
+              <a:rPr lang="en-AU" dirty="0"/>
+              <a:t>Attack categorisation  </a:t>
+            </a:r>
+          </a:p>
+        </p:txBody>
+      </p:sp>
+      <p:sp>
+        <p:nvSpPr>
+          <p:cNvPr id="3" name="Content Placeholder 2">
+            <a:extLst>
+              <a:ext uri="{FF2B5EF4-FFF2-40B4-BE49-F238E27FC236}">
+                <a16:creationId xmlns:a16="http://schemas.microsoft.com/office/drawing/2014/main" id="{AD495B3A-CEAE-E2C0-D4ED-11CC207B8DCE}"/>
+              </a:ext>
+            </a:extLst>
+          </p:cNvPr>
+          <p:cNvSpPr>
+            <a:spLocks noGrp="1"/>
+          </p:cNvSpPr>
+          <p:nvPr>
+            <p:ph idx="1"/>
+          </p:nvPr>
+        </p:nvSpPr>
+        <p:spPr/>
+        <p:txBody>
+          <a:bodyPr/>
+          <a:lstStyle/>
+          <a:p>
+            <a:endParaRPr lang="en-AU" dirty="0"/>
+          </a:p>
+        </p:txBody>
+      </p:sp>
+    </p:spTree>
+    <p:extLst>
+      <p:ext uri="{BB962C8B-B14F-4D97-AF65-F5344CB8AC3E}">
+        <p14:creationId xmlns:p14="http://schemas.microsoft.com/office/powerpoint/2010/main" val="3898587437"/>
+      </p:ext>
+    </p:extLst>
+  </p:cSld>
+  <p:clrMapOvr>
+    <a:masterClrMapping/>
+  </p:clrMapOvr>
+</p:sld>
+</file>
+
+<file path=ppt/slides/slide4.xml><?xml version="1.0" encoding="utf-8"?>
 <p:sld xmlns:a="http://schemas.openxmlformats.org/drawingml/2006/main" xmlns:r="http://schemas.openxmlformats.org/officeDocument/2006/relationships" xmlns:p="http://schemas.openxmlformats.org/presentationml/2006/main">
   <p:cSld>
     <p:spTree>

</xml_diff>

<commit_message>
function templates and references
</commit_message>
<xml_diff>
--- a/evidence.pptx
+++ b/evidence.pptx
@@ -264,7 +264,7 @@
           <a:p>
             <a:fld id="{06A7A16A-6445-44E0-84C3-2A5BD5D79C2E}" type="datetimeFigureOut">
               <a:rPr lang="en-AU" smtClean="0"/>
-              <a:t>21/09/2023</a:t>
+              <a:t>22/09/2023</a:t>
             </a:fld>
             <a:endParaRPr lang="en-AU"/>
           </a:p>
@@ -464,7 +464,7 @@
           <a:p>
             <a:fld id="{06A7A16A-6445-44E0-84C3-2A5BD5D79C2E}" type="datetimeFigureOut">
               <a:rPr lang="en-AU" smtClean="0"/>
-              <a:t>21/09/2023</a:t>
+              <a:t>22/09/2023</a:t>
             </a:fld>
             <a:endParaRPr lang="en-AU"/>
           </a:p>
@@ -674,7 +674,7 @@
           <a:p>
             <a:fld id="{06A7A16A-6445-44E0-84C3-2A5BD5D79C2E}" type="datetimeFigureOut">
               <a:rPr lang="en-AU" smtClean="0"/>
-              <a:t>21/09/2023</a:t>
+              <a:t>22/09/2023</a:t>
             </a:fld>
             <a:endParaRPr lang="en-AU"/>
           </a:p>
@@ -874,7 +874,7 @@
           <a:p>
             <a:fld id="{06A7A16A-6445-44E0-84C3-2A5BD5D79C2E}" type="datetimeFigureOut">
               <a:rPr lang="en-AU" smtClean="0"/>
-              <a:t>21/09/2023</a:t>
+              <a:t>22/09/2023</a:t>
             </a:fld>
             <a:endParaRPr lang="en-AU"/>
           </a:p>
@@ -1150,7 +1150,7 @@
           <a:p>
             <a:fld id="{06A7A16A-6445-44E0-84C3-2A5BD5D79C2E}" type="datetimeFigureOut">
               <a:rPr lang="en-AU" smtClean="0"/>
-              <a:t>21/09/2023</a:t>
+              <a:t>22/09/2023</a:t>
             </a:fld>
             <a:endParaRPr lang="en-AU"/>
           </a:p>
@@ -1418,7 +1418,7 @@
           <a:p>
             <a:fld id="{06A7A16A-6445-44E0-84C3-2A5BD5D79C2E}" type="datetimeFigureOut">
               <a:rPr lang="en-AU" smtClean="0"/>
-              <a:t>21/09/2023</a:t>
+              <a:t>22/09/2023</a:t>
             </a:fld>
             <a:endParaRPr lang="en-AU"/>
           </a:p>
@@ -1833,7 +1833,7 @@
           <a:p>
             <a:fld id="{06A7A16A-6445-44E0-84C3-2A5BD5D79C2E}" type="datetimeFigureOut">
               <a:rPr lang="en-AU" smtClean="0"/>
-              <a:t>21/09/2023</a:t>
+              <a:t>22/09/2023</a:t>
             </a:fld>
             <a:endParaRPr lang="en-AU"/>
           </a:p>
@@ -1975,7 +1975,7 @@
           <a:p>
             <a:fld id="{06A7A16A-6445-44E0-84C3-2A5BD5D79C2E}" type="datetimeFigureOut">
               <a:rPr lang="en-AU" smtClean="0"/>
-              <a:t>21/09/2023</a:t>
+              <a:t>22/09/2023</a:t>
             </a:fld>
             <a:endParaRPr lang="en-AU"/>
           </a:p>
@@ -2088,7 +2088,7 @@
           <a:p>
             <a:fld id="{06A7A16A-6445-44E0-84C3-2A5BD5D79C2E}" type="datetimeFigureOut">
               <a:rPr lang="en-AU" smtClean="0"/>
-              <a:t>21/09/2023</a:t>
+              <a:t>22/09/2023</a:t>
             </a:fld>
             <a:endParaRPr lang="en-AU"/>
           </a:p>
@@ -2401,7 +2401,7 @@
           <a:p>
             <a:fld id="{06A7A16A-6445-44E0-84C3-2A5BD5D79C2E}" type="datetimeFigureOut">
               <a:rPr lang="en-AU" smtClean="0"/>
-              <a:t>21/09/2023</a:t>
+              <a:t>22/09/2023</a:t>
             </a:fld>
             <a:endParaRPr lang="en-AU"/>
           </a:p>
@@ -2690,7 +2690,7 @@
           <a:p>
             <a:fld id="{06A7A16A-6445-44E0-84C3-2A5BD5D79C2E}" type="datetimeFigureOut">
               <a:rPr lang="en-AU" smtClean="0"/>
-              <a:t>21/09/2023</a:t>
+              <a:t>22/09/2023</a:t>
             </a:fld>
             <a:endParaRPr lang="en-AU"/>
           </a:p>
@@ -2933,7 +2933,7 @@
           <a:p>
             <a:fld id="{06A7A16A-6445-44E0-84C3-2A5BD5D79C2E}" type="datetimeFigureOut">
               <a:rPr lang="en-AU" smtClean="0"/>
-              <a:t>21/09/2023</a:t>
+              <a:t>22/09/2023</a:t>
             </a:fld>
             <a:endParaRPr lang="en-AU"/>
           </a:p>
@@ -3491,14 +3491,14 @@
           <p:nvPr>
             <p:extLst>
               <p:ext uri="{D42A27DB-BD31-4B8C-83A1-F6EECF244321}">
-                <p14:modId xmlns:p14="http://schemas.microsoft.com/office/powerpoint/2010/main" val="3837343450"/>
+                <p14:modId xmlns:p14="http://schemas.microsoft.com/office/powerpoint/2010/main" val="226605778"/>
               </p:ext>
             </p:extLst>
           </p:nvPr>
         </p:nvGraphicFramePr>
         <p:xfrm>
           <a:off x="647700" y="1328738"/>
-          <a:ext cx="11125200" cy="4038600"/>
+          <a:ext cx="11125200" cy="3489960"/>
         </p:xfrm>
         <a:graphic>
           <a:graphicData uri="http://schemas.openxmlformats.org/drawingml/2006/table">
@@ -3795,24 +3795,27 @@
                       </a:r>
                       <a:r>
                         <a:rPr lang="en-AU" sz="1800" b="1" dirty="0"/>
-                        <a:t>vssadmin.exe delete shadows /all /quiet </a:t>
-                      </a:r>
-                      <a:r>
-                        <a:rPr lang="en-AU" sz="1800" dirty="0"/>
-                        <a:t>and </a:t>
-                      </a:r>
-                      <a:r>
-                        <a:rPr lang="en-AU" sz="1800" b="1" dirty="0"/>
-                        <a:t>wmic.exe </a:t>
-                      </a:r>
-                      <a:r>
-                        <a:rPr lang="en-AU" sz="1800" b="1" dirty="0" err="1"/>
-                        <a:t>Shadowcopy</a:t>
-                      </a:r>
-                      <a:r>
-                        <a:rPr lang="en-AU" sz="1800" b="1" dirty="0"/>
-                        <a:t> Delete; </a:t>
-                      </a:r>
+                        <a:t>vssadmin.exe and wmic.exe </a:t>
+                      </a:r>
+                    </a:p>
+                    <a:p>
+                      <a:pPr marL="0" marR="0" lvl="0" indent="0" algn="l" defTabSz="914400" rtl="0" eaLnBrk="1" fontAlgn="auto" latinLnBrk="0" hangingPunct="1">
+                        <a:lnSpc>
+                          <a:spcPct val="100000"/>
+                        </a:lnSpc>
+                        <a:spcBef>
+                          <a:spcPts val="0"/>
+                        </a:spcBef>
+                        <a:spcAft>
+                          <a:spcPts val="0"/>
+                        </a:spcAft>
+                        <a:buClrTx/>
+                        <a:buSzTx/>
+                        <a:buFontTx/>
+                        <a:buNone/>
+                        <a:tabLst/>
+                        <a:defRPr/>
+                      </a:pPr>
                       <a:r>
                         <a:rPr lang="en-AU" sz="1800" dirty="0"/>
                         <a:t>it can also modify the boot loader using </a:t>
@@ -3823,20 +3826,31 @@
                       </a:r>
                       <a:r>
                         <a:rPr lang="en-AU" sz="1800" b="1" dirty="0"/>
-                        <a:t> /set {default} </a:t>
-                      </a:r>
-                      <a:r>
-                        <a:rPr lang="en-AU" sz="1800" b="1" dirty="0" err="1"/>
-                        <a:t>recoveryenabled</a:t>
-                      </a:r>
-                      <a:r>
-                        <a:rPr lang="en-AU" sz="1800" b="1" dirty="0"/>
-                        <a:t> No</a:t>
-                      </a:r>
-                      <a:endParaRPr lang="en-GB" sz="1800" b="1" dirty="0"/>
+                        <a:t> </a:t>
+                      </a:r>
                     </a:p>
                     <a:p>
-                      <a:endParaRPr lang="en-AU" dirty="0"/>
+                      <a:pPr marL="0" marR="0" lvl="0" indent="0" algn="l" defTabSz="914400" rtl="0" eaLnBrk="1" fontAlgn="auto" latinLnBrk="0" hangingPunct="1">
+                        <a:lnSpc>
+                          <a:spcPct val="100000"/>
+                        </a:lnSpc>
+                        <a:spcBef>
+                          <a:spcPts val="0"/>
+                        </a:spcBef>
+                        <a:spcAft>
+                          <a:spcPts val="0"/>
+                        </a:spcAft>
+                        <a:buClrTx/>
+                        <a:buSzTx/>
+                        <a:buFontTx/>
+                        <a:buNone/>
+                        <a:tabLst/>
+                        <a:defRPr/>
+                      </a:pPr>
+                      <a:r>
+                        <a:rPr lang="en-AU" dirty="0"/>
+                        <a:t>(Clark et al., 2019)</a:t>
+                      </a:r>
                     </a:p>
                   </a:txBody>
                   <a:tcPr/>
@@ -3949,36 +3963,415 @@
           <a:p>
             <a:r>
               <a:rPr lang="en-AU" dirty="0"/>
-              <a:t>Attack categorisation  </a:t>
-            </a:r>
-          </a:p>
-        </p:txBody>
-      </p:sp>
-      <p:sp>
-        <p:nvSpPr>
-          <p:cNvPr id="3" name="Content Placeholder 2">
-            <a:extLst>
-              <a:ext uri="{FF2B5EF4-FFF2-40B4-BE49-F238E27FC236}">
-                <a16:creationId xmlns:a16="http://schemas.microsoft.com/office/drawing/2014/main" id="{AD495B3A-CEAE-E2C0-D4ED-11CC207B8DCE}"/>
-              </a:ext>
-            </a:extLst>
-          </p:cNvPr>
-          <p:cNvSpPr>
-            <a:spLocks noGrp="1"/>
-          </p:cNvSpPr>
+              <a:t>Detailed commands</a:t>
+            </a:r>
+          </a:p>
+        </p:txBody>
+      </p:sp>
+      <p:graphicFrame>
+        <p:nvGraphicFramePr>
+          <p:cNvPr id="4" name="Table 4">
+            <a:extLst>
+              <a:ext uri="{FF2B5EF4-FFF2-40B4-BE49-F238E27FC236}">
+                <a16:creationId xmlns:a16="http://schemas.microsoft.com/office/drawing/2014/main" id="{9B48E109-1677-AD53-CBAD-A2E43739327D}"/>
+              </a:ext>
+            </a:extLst>
+          </p:cNvPr>
+          <p:cNvGraphicFramePr>
+            <a:graphicFrameLocks noGrp="1"/>
+          </p:cNvGraphicFramePr>
           <p:nvPr>
             <p:ph idx="1"/>
-          </p:nvPr>
-        </p:nvSpPr>
-        <p:spPr/>
-        <p:txBody>
-          <a:bodyPr/>
-          <a:lstStyle/>
-          <a:p>
-            <a:endParaRPr lang="en-AU" dirty="0"/>
-          </a:p>
-        </p:txBody>
-      </p:sp>
+            <p:extLst>
+              <p:ext uri="{D42A27DB-BD31-4B8C-83A1-F6EECF244321}">
+                <p14:modId xmlns:p14="http://schemas.microsoft.com/office/powerpoint/2010/main" val="2334195082"/>
+              </p:ext>
+            </p:extLst>
+          </p:nvPr>
+        </p:nvGraphicFramePr>
+        <p:xfrm>
+          <a:off x="838200" y="1825625"/>
+          <a:ext cx="10725150" cy="3002280"/>
+        </p:xfrm>
+        <a:graphic>
+          <a:graphicData uri="http://schemas.openxmlformats.org/drawingml/2006/table">
+            <a:tbl>
+              <a:tblPr firstRow="1" bandRow="1">
+                <a:tableStyleId>{5C22544A-7EE6-4342-B048-85BDC9FD1C3A}</a:tableStyleId>
+              </a:tblPr>
+              <a:tblGrid>
+                <a:gridCol w="5362575">
+                  <a:extLst>
+                    <a:ext uri="{9D8B030D-6E8A-4147-A177-3AD203B41FA5}">
+                      <a16:colId xmlns:a16="http://schemas.microsoft.com/office/drawing/2014/main" val="62658098"/>
+                    </a:ext>
+                  </a:extLst>
+                </a:gridCol>
+                <a:gridCol w="5362575">
+                  <a:extLst>
+                    <a:ext uri="{9D8B030D-6E8A-4147-A177-3AD203B41FA5}">
+                      <a16:colId xmlns:a16="http://schemas.microsoft.com/office/drawing/2014/main" val="3171455961"/>
+                    </a:ext>
+                  </a:extLst>
+                </a:gridCol>
+              </a:tblGrid>
+              <a:tr h="370840">
+                <a:tc>
+                  <a:txBody>
+                    <a:bodyPr/>
+                    <a:lstStyle/>
+                    <a:p>
+                      <a:r>
+                        <a:rPr lang="en-AU" dirty="0"/>
+                        <a:t>Name</a:t>
+                      </a:r>
+                    </a:p>
+                  </a:txBody>
+                  <a:tcPr/>
+                </a:tc>
+                <a:tc>
+                  <a:txBody>
+                    <a:bodyPr/>
+                    <a:lstStyle/>
+                    <a:p>
+                      <a:r>
+                        <a:rPr lang="en-AU" dirty="0"/>
+                        <a:t>Detailed command</a:t>
+                      </a:r>
+                    </a:p>
+                  </a:txBody>
+                  <a:tcPr/>
+                </a:tc>
+                <a:extLst>
+                  <a:ext uri="{0D108BD9-81ED-4DB2-BD59-A6C34878D82A}">
+                    <a16:rowId xmlns:a16="http://schemas.microsoft.com/office/drawing/2014/main" val="301619688"/>
+                  </a:ext>
+                </a:extLst>
+              </a:tr>
+              <a:tr h="370840">
+                <a:tc>
+                  <a:txBody>
+                    <a:bodyPr/>
+                    <a:lstStyle/>
+                    <a:p>
+                      <a:pPr marL="0" marR="0" lvl="0" indent="0" algn="l" defTabSz="914400" rtl="0" eaLnBrk="1" fontAlgn="auto" latinLnBrk="0" hangingPunct="1">
+                        <a:lnSpc>
+                          <a:spcPct val="100000"/>
+                        </a:lnSpc>
+                        <a:spcBef>
+                          <a:spcPts val="0"/>
+                        </a:spcBef>
+                        <a:spcAft>
+                          <a:spcPts val="0"/>
+                        </a:spcAft>
+                        <a:buClrTx/>
+                        <a:buSzTx/>
+                        <a:buFontTx/>
+                        <a:buNone/>
+                        <a:tabLst/>
+                        <a:defRPr/>
+                      </a:pPr>
+                      <a:r>
+                        <a:rPr lang="en-AU" sz="1400" b="0" dirty="0">
+                          <a:hlinkClick r:id="rId2"/>
+                        </a:rPr>
+                        <a:t>T1033</a:t>
+                      </a:r>
+                      <a:r>
+                        <a:rPr lang="en-AU" sz="1400" b="0" dirty="0"/>
+                        <a:t> </a:t>
+                      </a:r>
+                      <a:r>
+                        <a:rPr lang="en-GB" sz="1400" b="0" dirty="0"/>
+                        <a:t>Net Use </a:t>
+                      </a:r>
+                      <a:endParaRPr lang="en-AU" sz="1400" b="0" dirty="0"/>
+                    </a:p>
+                  </a:txBody>
+                  <a:tcPr/>
+                </a:tc>
+                <a:tc>
+                  <a:txBody>
+                    <a:bodyPr/>
+                    <a:lstStyle/>
+                    <a:p>
+                      <a:endParaRPr lang="en-AU" sz="1400" b="0" dirty="0"/>
+                    </a:p>
+                  </a:txBody>
+                  <a:tcPr/>
+                </a:tc>
+                <a:extLst>
+                  <a:ext uri="{0D108BD9-81ED-4DB2-BD59-A6C34878D82A}">
+                    <a16:rowId xmlns:a16="http://schemas.microsoft.com/office/drawing/2014/main" val="1517858066"/>
+                  </a:ext>
+                </a:extLst>
+              </a:tr>
+              <a:tr h="370840">
+                <a:tc>
+                  <a:txBody>
+                    <a:bodyPr/>
+                    <a:lstStyle/>
+                    <a:p>
+                      <a:pPr marL="0" marR="0" lvl="0" indent="0" algn="l" defTabSz="914400" rtl="0" eaLnBrk="1" fontAlgn="auto" latinLnBrk="0" hangingPunct="1">
+                        <a:lnSpc>
+                          <a:spcPct val="100000"/>
+                        </a:lnSpc>
+                        <a:spcBef>
+                          <a:spcPts val="0"/>
+                        </a:spcBef>
+                        <a:spcAft>
+                          <a:spcPts val="0"/>
+                        </a:spcAft>
+                        <a:buClrTx/>
+                        <a:buSzTx/>
+                        <a:buFontTx/>
+                        <a:buNone/>
+                        <a:tabLst/>
+                        <a:defRPr/>
+                      </a:pPr>
+                      <a:r>
+                        <a:rPr lang="en-AU" sz="1400" b="0" dirty="0">
+                          <a:hlinkClick r:id="rId3"/>
+                        </a:rPr>
+                        <a:t>T1570</a:t>
+                      </a:r>
+                      <a:r>
+                        <a:rPr lang="en-AU" sz="1400" b="0" dirty="0"/>
+                        <a:t> </a:t>
+                      </a:r>
+                      <a:r>
+                        <a:rPr lang="en-AU" sz="1400" b="0" dirty="0" err="1"/>
+                        <a:t>PsExec</a:t>
+                      </a:r>
+                      <a:r>
+                        <a:rPr lang="en-AU" sz="1400" b="0" dirty="0"/>
+                        <a:t> </a:t>
+                      </a:r>
+                    </a:p>
+                    <a:p>
+                      <a:endParaRPr lang="en-AU" sz="1400" b="0" dirty="0"/>
+                    </a:p>
+                  </a:txBody>
+                  <a:tcPr/>
+                </a:tc>
+                <a:tc>
+                  <a:txBody>
+                    <a:bodyPr/>
+                    <a:lstStyle/>
+                    <a:p>
+                      <a:pPr marL="0" marR="0" lvl="0" indent="0" algn="l" defTabSz="914400" rtl="0" eaLnBrk="1" fontAlgn="auto" latinLnBrk="0" hangingPunct="1">
+                        <a:lnSpc>
+                          <a:spcPct val="100000"/>
+                        </a:lnSpc>
+                        <a:spcBef>
+                          <a:spcPts val="0"/>
+                        </a:spcBef>
+                        <a:spcAft>
+                          <a:spcPts val="0"/>
+                        </a:spcAft>
+                        <a:buClrTx/>
+                        <a:buSzTx/>
+                        <a:buFontTx/>
+                        <a:buNone/>
+                        <a:tabLst/>
+                        <a:defRPr/>
+                      </a:pPr>
+                      <a:r>
+                        <a:rPr lang="en-AU" sz="1400" b="0" dirty="0"/>
+                        <a:t>psexec.exe -</a:t>
+                      </a:r>
+                      <a:r>
+                        <a:rPr lang="en-AU" sz="1400" b="0" dirty="0" err="1"/>
+                        <a:t>accepteula</a:t>
+                      </a:r>
+                      <a:r>
+                        <a:rPr lang="en-AU" sz="1400" b="0" dirty="0"/>
+                        <a:t> \\&lt;TARGET_HOST&gt; -u &lt;USERNAME&gt; -p &lt;PASSWORD&gt; -s -d -f -c &lt;ALPHV_EXECUTABLE&gt; [FLAGS] [OPTIONS] --access-token &lt;ACCESS_TOKEN&gt; [SUBCOMMAND] </a:t>
+                      </a:r>
+                    </a:p>
+                    <a:p>
+                      <a:r>
+                        <a:rPr lang="en-AU" sz="1400" dirty="0"/>
+                        <a:t>(</a:t>
+                      </a:r>
+                      <a:r>
+                        <a:rPr lang="en-AU" sz="1400" dirty="0" err="1"/>
+                        <a:t>Bouchrika</a:t>
+                      </a:r>
+                      <a:r>
+                        <a:rPr lang="en-AU" sz="1400" dirty="0"/>
+                        <a:t>, 2023)</a:t>
+                      </a:r>
+                      <a:endParaRPr lang="en-AU" sz="1400" b="0" dirty="0"/>
+                    </a:p>
+                  </a:txBody>
+                  <a:tcPr/>
+                </a:tc>
+                <a:extLst>
+                  <a:ext uri="{0D108BD9-81ED-4DB2-BD59-A6C34878D82A}">
+                    <a16:rowId xmlns:a16="http://schemas.microsoft.com/office/drawing/2014/main" val="1992186981"/>
+                  </a:ext>
+                </a:extLst>
+              </a:tr>
+              <a:tr h="370840">
+                <a:tc>
+                  <a:txBody>
+                    <a:bodyPr/>
+                    <a:lstStyle/>
+                    <a:p>
+                      <a:pPr marL="0" marR="0" lvl="0" indent="0" algn="l" defTabSz="914400" rtl="0" eaLnBrk="1" fontAlgn="auto" latinLnBrk="0" hangingPunct="1">
+                        <a:lnSpc>
+                          <a:spcPct val="100000"/>
+                        </a:lnSpc>
+                        <a:spcBef>
+                          <a:spcPts val="0"/>
+                        </a:spcBef>
+                        <a:spcAft>
+                          <a:spcPts val="0"/>
+                        </a:spcAft>
+                        <a:buClrTx/>
+                        <a:buSzTx/>
+                        <a:buFontTx/>
+                        <a:buNone/>
+                        <a:tabLst/>
+                        <a:defRPr/>
+                      </a:pPr>
+                      <a:r>
+                        <a:rPr lang="en-AU" sz="1400" b="0" dirty="0">
+                          <a:hlinkClick r:id="rId4"/>
+                        </a:rPr>
+                        <a:t>T1059</a:t>
+                      </a:r>
+                      <a:r>
+                        <a:rPr lang="en-AU" sz="1400" b="0" dirty="0"/>
+                        <a:t> </a:t>
+                      </a:r>
+                      <a:r>
+                        <a:rPr lang="en-GB" sz="1400" b="0" dirty="0"/>
+                        <a:t>cmd.exe</a:t>
+                      </a:r>
+                      <a:endParaRPr lang="en-AU" sz="1400" b="0" dirty="0"/>
+                    </a:p>
+                  </a:txBody>
+                  <a:tcPr/>
+                </a:tc>
+                <a:tc>
+                  <a:txBody>
+                    <a:bodyPr/>
+                    <a:lstStyle/>
+                    <a:p>
+                      <a:endParaRPr lang="en-AU" sz="1400" b="0" dirty="0"/>
+                    </a:p>
+                  </a:txBody>
+                  <a:tcPr/>
+                </a:tc>
+                <a:extLst>
+                  <a:ext uri="{0D108BD9-81ED-4DB2-BD59-A6C34878D82A}">
+                    <a16:rowId xmlns:a16="http://schemas.microsoft.com/office/drawing/2014/main" val="3828133086"/>
+                  </a:ext>
+                </a:extLst>
+              </a:tr>
+              <a:tr h="370840">
+                <a:tc>
+                  <a:txBody>
+                    <a:bodyPr/>
+                    <a:lstStyle/>
+                    <a:p>
+                      <a:pPr marL="0" marR="0" lvl="0" indent="0" algn="l" defTabSz="914400" rtl="0" eaLnBrk="1" fontAlgn="auto" latinLnBrk="0" hangingPunct="1">
+                        <a:lnSpc>
+                          <a:spcPct val="100000"/>
+                        </a:lnSpc>
+                        <a:spcBef>
+                          <a:spcPts val="0"/>
+                        </a:spcBef>
+                        <a:spcAft>
+                          <a:spcPts val="0"/>
+                        </a:spcAft>
+                        <a:buClrTx/>
+                        <a:buSzTx/>
+                        <a:buFontTx/>
+                        <a:buNone/>
+                        <a:tabLst/>
+                        <a:defRPr/>
+                      </a:pPr>
+                      <a:r>
+                        <a:rPr lang="en-AU" sz="1400" b="0" dirty="0">
+                          <a:hlinkClick r:id="rId5"/>
+                        </a:rPr>
+                        <a:t>T1490</a:t>
+                      </a:r>
+                      <a:r>
+                        <a:rPr lang="en-AU" sz="1400" b="0" dirty="0"/>
+                        <a:t> vssadmin.exe </a:t>
+                      </a:r>
+                    </a:p>
+                  </a:txBody>
+                  <a:tcPr/>
+                </a:tc>
+                <a:tc>
+                  <a:txBody>
+                    <a:bodyPr/>
+                    <a:lstStyle/>
+                    <a:p>
+                      <a:r>
+                        <a:rPr lang="en-AU" sz="1400" b="0" dirty="0"/>
+                        <a:t>vssadmin.exe delete shadows /all /quiet</a:t>
+                      </a:r>
+                      <a:br>
+                        <a:rPr lang="en-AU" sz="1400" b="0" dirty="0"/>
+                      </a:br>
+                      <a:r>
+                        <a:rPr lang="en-AU" sz="1400" b="0" dirty="0"/>
+                        <a:t>wmic.exe </a:t>
+                      </a:r>
+                      <a:r>
+                        <a:rPr lang="en-AU" sz="1400" b="0" dirty="0" err="1"/>
+                        <a:t>Shadowcopy</a:t>
+                      </a:r>
+                      <a:r>
+                        <a:rPr lang="en-AU" sz="1400" b="0" dirty="0"/>
+                        <a:t> Delete</a:t>
+                      </a:r>
+                    </a:p>
+                    <a:p>
+                      <a:r>
+                        <a:rPr lang="en-AU" sz="1400" b="0" dirty="0" err="1"/>
+                        <a:t>bcdedit</a:t>
+                      </a:r>
+                      <a:r>
+                        <a:rPr lang="en-AU" sz="1400" b="0" dirty="0"/>
+                        <a:t> /set {default} </a:t>
+                      </a:r>
+                      <a:r>
+                        <a:rPr lang="en-AU" sz="1400" b="0" dirty="0" err="1"/>
+                        <a:t>recoveryenabled</a:t>
+                      </a:r>
+                      <a:r>
+                        <a:rPr lang="en-AU" sz="1400" b="0" dirty="0"/>
+                        <a:t> No</a:t>
+                      </a:r>
+                      <a:br>
+                        <a:rPr lang="en-AU" sz="1400" b="0" dirty="0"/>
+                      </a:br>
+                      <a:r>
+                        <a:rPr lang="en-AU" sz="1400" dirty="0"/>
+                        <a:t>(Clark et al., 2019)</a:t>
+                      </a:r>
+                      <a:endParaRPr lang="en-AU" sz="1400" b="0" dirty="0"/>
+                    </a:p>
+                  </a:txBody>
+                  <a:tcPr/>
+                </a:tc>
+                <a:extLst>
+                  <a:ext uri="{0D108BD9-81ED-4DB2-BD59-A6C34878D82A}">
+                    <a16:rowId xmlns:a16="http://schemas.microsoft.com/office/drawing/2014/main" val="1798786680"/>
+                  </a:ext>
+                </a:extLst>
+              </a:tr>
+            </a:tbl>
+          </a:graphicData>
+        </a:graphic>
+      </p:graphicFrame>
     </p:spTree>
     <p:extLst>
       <p:ext uri="{BB962C8B-B14F-4D97-AF65-F5344CB8AC3E}">
@@ -4055,39 +4448,241 @@
         </p:nvSpPr>
         <p:spPr/>
         <p:txBody>
-          <a:bodyPr/>
-          <a:lstStyle/>
-          <a:p>
-            <a:r>
-              <a:rPr lang="en-AU" dirty="0">
-                <a:hlinkClick r:id="rId2"/>
+          <a:bodyPr>
+            <a:normAutofit/>
+          </a:bodyPr>
+          <a:lstStyle/>
+          <a:p>
+            <a:r>
+              <a:rPr lang="en-AU" sz="1200" dirty="0">
+                <a:effectLst/>
               </a:rPr>
-              <a:t>https://securityscorecard.com/research/deep-dive-into-alphv-blackcat-ransomware/</a:t>
-            </a:r>
-            <a:r>
-              <a:rPr lang="en-AU" dirty="0"/>
-              <a:t> detailed analysis  of how </a:t>
-            </a:r>
-            <a:r>
-              <a:rPr lang="en-AU" dirty="0" err="1"/>
-              <a:t>blackcat</a:t>
-            </a:r>
-            <a:r>
-              <a:rPr lang="en-AU" dirty="0"/>
-              <a:t> works under the hood.</a:t>
-            </a:r>
-          </a:p>
-          <a:p>
-            <a:r>
-              <a:rPr lang="en-AU" dirty="0">
-                <a:hlinkClick r:id="rId3"/>
+              <a:t>ALPHV/</a:t>
+            </a:r>
+            <a:r>
+              <a:rPr lang="en-AU" sz="1200" dirty="0" err="1">
+                <a:effectLst/>
               </a:rPr>
-              <a:t>https://atomicredteam.io/discovery/T1083/</a:t>
-            </a:r>
-            <a:endParaRPr lang="en-AU" dirty="0"/>
-          </a:p>
-          <a:p>
-            <a:endParaRPr lang="en-AU" dirty="0"/>
+              <a:t>BlackCat</a:t>
+            </a:r>
+            <a:r>
+              <a:rPr lang="en-AU" sz="1200" dirty="0">
+                <a:effectLst/>
+              </a:rPr>
+              <a:t> Ransomware, A.D.D.I. (2023) </a:t>
+            </a:r>
+            <a:r>
+              <a:rPr lang="en-AU" sz="1200" i="1" dirty="0">
+                <a:effectLst/>
+              </a:rPr>
+              <a:t>A deep dive into ALPHV/</a:t>
+            </a:r>
+            <a:r>
+              <a:rPr lang="en-AU" sz="1200" i="1" dirty="0" err="1">
+                <a:effectLst/>
+              </a:rPr>
+              <a:t>BlackCat</a:t>
+            </a:r>
+            <a:r>
+              <a:rPr lang="en-AU" sz="1200" i="1" dirty="0">
+                <a:effectLst/>
+              </a:rPr>
+              <a:t> ransomware</a:t>
+            </a:r>
+            <a:r>
+              <a:rPr lang="en-AU" sz="1200" dirty="0">
+                <a:effectLst/>
+              </a:rPr>
+              <a:t>, </a:t>
+            </a:r>
+            <a:r>
+              <a:rPr lang="en-AU" sz="1200" i="1" dirty="0" err="1">
+                <a:effectLst/>
+              </a:rPr>
+              <a:t>SecurityScorecard</a:t>
+            </a:r>
+            <a:r>
+              <a:rPr lang="en-AU" sz="1200" dirty="0">
+                <a:effectLst/>
+              </a:rPr>
+              <a:t>. Available at: https://securityscorecard.com/research/deep-dive-into-alphv-blackcat-ransomware/ (Accessed: 22 September 2023). </a:t>
+            </a:r>
+          </a:p>
+          <a:p>
+            <a:r>
+              <a:rPr lang="en-AU" sz="1200" dirty="0" err="1">
+                <a:effectLst/>
+              </a:rPr>
+              <a:t>Bouchrika</a:t>
+            </a:r>
+            <a:r>
+              <a:rPr lang="en-AU" sz="1200" dirty="0">
+                <a:effectLst/>
+              </a:rPr>
+              <a:t>, I. (2023) </a:t>
+            </a:r>
+            <a:r>
+              <a:rPr lang="en-AU" sz="1200" i="1" dirty="0" err="1">
+                <a:effectLst/>
+              </a:rPr>
+              <a:t>BlackCat</a:t>
+            </a:r>
+            <a:r>
+              <a:rPr lang="en-AU" sz="1200" i="1" dirty="0">
+                <a:effectLst/>
+              </a:rPr>
+              <a:t> ransomware (ALPHV)</a:t>
+            </a:r>
+            <a:r>
+              <a:rPr lang="en-AU" sz="1200" dirty="0">
+                <a:effectLst/>
+              </a:rPr>
+              <a:t>, </a:t>
+            </a:r>
+            <a:r>
+              <a:rPr lang="en-AU" sz="1200" i="1" dirty="0">
+                <a:effectLst/>
+              </a:rPr>
+              <a:t>Varonis</a:t>
+            </a:r>
+            <a:r>
+              <a:rPr lang="en-AU" sz="1200" dirty="0">
+                <a:effectLst/>
+              </a:rPr>
+              <a:t>. Available at: https://www.varonis.com/blog/blackcat-ransomware (Accessed: 22 September 2023). </a:t>
+            </a:r>
+          </a:p>
+          <a:p>
+            <a:r>
+              <a:rPr lang="en-AU" sz="1200" dirty="0">
+                <a:effectLst/>
+              </a:rPr>
+              <a:t>Clark, A., Sivakumaran, P. and </a:t>
+            </a:r>
+            <a:r>
+              <a:rPr lang="en-AU" sz="1200" dirty="0" err="1">
+                <a:effectLst/>
+              </a:rPr>
+              <a:t>Gotlib</a:t>
+            </a:r>
+            <a:r>
+              <a:rPr lang="en-AU" sz="1200" dirty="0">
+                <a:effectLst/>
+              </a:rPr>
+              <a:t>, Y. (2019) </a:t>
+            </a:r>
+            <a:r>
+              <a:rPr lang="en-AU" sz="1200" i="1" dirty="0">
+                <a:effectLst/>
+              </a:rPr>
+              <a:t>Inhibit system recovery</a:t>
+            </a:r>
+            <a:r>
+              <a:rPr lang="en-AU" sz="1200" dirty="0">
+                <a:effectLst/>
+              </a:rPr>
+              <a:t>, </a:t>
+            </a:r>
+            <a:r>
+              <a:rPr lang="en-AU" sz="1200" i="1" dirty="0">
+                <a:effectLst/>
+              </a:rPr>
+              <a:t>Inhibit System Recovery, Technique T1490 - Enterprise | MITRE ATT&amp;CK®</a:t>
+            </a:r>
+            <a:r>
+              <a:rPr lang="en-AU" sz="1200" dirty="0">
+                <a:effectLst/>
+              </a:rPr>
+              <a:t>. Available at: https://attack.mitre.org/techniques/T1490/ (Accessed: 22 September 2023). </a:t>
+            </a:r>
+          </a:p>
+          <a:p>
+            <a:r>
+              <a:rPr lang="en-AU" sz="1200" dirty="0" err="1">
+                <a:effectLst/>
+              </a:rPr>
+              <a:t>Nagahama</a:t>
+            </a:r>
+            <a:r>
+              <a:rPr lang="en-AU" sz="1200" dirty="0">
+                <a:effectLst/>
+              </a:rPr>
+              <a:t>, H. </a:t>
+            </a:r>
+            <a:r>
+              <a:rPr lang="en-AU" sz="1200" i="1" dirty="0">
+                <a:effectLst/>
+              </a:rPr>
+              <a:t>et al.</a:t>
+            </a:r>
+            <a:r>
+              <a:rPr lang="en-AU" sz="1200" dirty="0">
+                <a:effectLst/>
+              </a:rPr>
+              <a:t> (2023) </a:t>
+            </a:r>
+            <a:r>
+              <a:rPr lang="en-AU" sz="1200" i="1" dirty="0">
+                <a:effectLst/>
+              </a:rPr>
+              <a:t>Blackcat</a:t>
+            </a:r>
+            <a:r>
+              <a:rPr lang="en-AU" sz="1200" dirty="0">
+                <a:effectLst/>
+              </a:rPr>
+              <a:t>, </a:t>
+            </a:r>
+            <a:r>
+              <a:rPr lang="en-AU" sz="1200" i="1" dirty="0" err="1">
+                <a:effectLst/>
+              </a:rPr>
+              <a:t>BlackCat</a:t>
+            </a:r>
+            <a:r>
+              <a:rPr lang="en-AU" sz="1200" i="1" dirty="0">
+                <a:effectLst/>
+              </a:rPr>
+              <a:t>, Software S1068 | MITRE ATT&amp;CK®</a:t>
+            </a:r>
+            <a:r>
+              <a:rPr lang="en-AU" sz="1200" dirty="0">
+                <a:effectLst/>
+              </a:rPr>
+              <a:t>. Available at: https://attack.mitre.org/software/S1068/ (Accessed: 22 September 2023). </a:t>
+            </a:r>
+          </a:p>
+          <a:p>
+            <a:r>
+              <a:rPr lang="en-AU" sz="1200" dirty="0">
+                <a:effectLst/>
+              </a:rPr>
+              <a:t>T1083, A. (2023) </a:t>
+            </a:r>
+            <a:r>
+              <a:rPr lang="en-AU" sz="1200" i="1" dirty="0">
+                <a:effectLst/>
+              </a:rPr>
+              <a:t>T1083</a:t>
+            </a:r>
+            <a:r>
+              <a:rPr lang="en-AU" sz="1200" dirty="0">
+                <a:effectLst/>
+              </a:rPr>
+              <a:t>, </a:t>
+            </a:r>
+            <a:r>
+              <a:rPr lang="en-AU" sz="1200" i="1" dirty="0">
+                <a:effectLst/>
+              </a:rPr>
+              <a:t>Explore Atomic Red Team</a:t>
+            </a:r>
+            <a:r>
+              <a:rPr lang="en-AU" sz="1200" dirty="0">
+                <a:effectLst/>
+              </a:rPr>
+              <a:t>. Available at: https://atomicredteam.io/discovery/T1083/ (Accessed: 22 September 2023). </a:t>
+            </a:r>
           </a:p>
         </p:txBody>
       </p:sp>

</xml_diff>

<commit_message>
added net use command
</commit_message>
<xml_diff>
--- a/evidence.pptx
+++ b/evidence.pptx
@@ -3984,14 +3984,14 @@
             <p:ph idx="1"/>
             <p:extLst>
               <p:ext uri="{D42A27DB-BD31-4B8C-83A1-F6EECF244321}">
-                <p14:modId xmlns:p14="http://schemas.microsoft.com/office/powerpoint/2010/main" val="2334195082"/>
+                <p14:modId xmlns:p14="http://schemas.microsoft.com/office/powerpoint/2010/main" val="299730999"/>
               </p:ext>
             </p:extLst>
           </p:nvPr>
         </p:nvGraphicFramePr>
         <p:xfrm>
           <a:off x="838200" y="1825625"/>
-          <a:ext cx="10725150" cy="3002280"/>
+          <a:ext cx="10725150" cy="3362960"/>
         </p:xfrm>
         <a:graphic>
           <a:graphicData uri="http://schemas.openxmlformats.org/drawingml/2006/table">
@@ -4095,6 +4095,32 @@
                     <a:bodyPr/>
                     <a:lstStyle/>
                     <a:p>
+                      <a:r>
+                        <a:rPr lang="en-GB" sz="1400" dirty="0"/>
+                        <a:t>net use \\[computer name]  /user:[domain]\[user] [password] /</a:t>
+                      </a:r>
+                      <a:r>
+                        <a:rPr lang="en-GB" sz="1400" dirty="0" err="1"/>
+                        <a:t>persistent:no</a:t>
+                      </a:r>
+                      <a:r>
+                        <a:rPr lang="en-GB" sz="1400" dirty="0"/>
+                        <a:t> </a:t>
+                      </a:r>
+                    </a:p>
+                    <a:p>
+                      <a:r>
+                        <a:rPr lang="en-AU" sz="1400" dirty="0"/>
+                        <a:t>(Microsoft </a:t>
+                      </a:r>
+                      <a:r>
+                        <a:rPr lang="en-AU" sz="1400"/>
+                        <a:t>Threat Intelligence, </a:t>
+                      </a:r>
+                      <a:r>
+                        <a:rPr lang="en-AU" sz="1400" dirty="0"/>
+                        <a:t>2022)</a:t>
+                      </a:r>
                       <a:endParaRPr lang="en-AU" sz="1400" b="0" dirty="0"/>
                     </a:p>
                   </a:txBody>

</xml_diff>

<commit_message>
Rule to detect vssadmin delete
</commit_message>
<xml_diff>
--- a/evidence.pptx
+++ b/evidence.pptx
@@ -8,7 +8,8 @@
     <p:sldId id="256" r:id="rId2"/>
     <p:sldId id="257" r:id="rId3"/>
     <p:sldId id="259" r:id="rId4"/>
-    <p:sldId id="258" r:id="rId5"/>
+    <p:sldId id="260" r:id="rId5"/>
+    <p:sldId id="258" r:id="rId6"/>
   </p:sldIdLst>
   <p:sldSz cx="12192000" cy="6858000"/>
   <p:notesSz cx="6858000" cy="9144000"/>
@@ -4013,11 +4014,11 @@
               <a:t>att&amp;ck</a:t>
             </a:r>
             <a:r>
-              <a:rPr lang="en-AU"/>
+              <a:rPr lang="en-AU" dirty="0"/>
               <a:t> page </a:t>
             </a:r>
             <a:r>
-              <a:rPr lang="en-AU">
+              <a:rPr lang="en-AU" dirty="0">
                 <a:hlinkClick r:id="rId7"/>
               </a:rPr>
               <a:t>https://attack.mitre.org/software/S1068/</a:t>
@@ -4026,7 +4027,6 @@
               <a:rPr lang="en-AU" dirty="0"/>
               <a:t> </a:t>
             </a:r>
-            <a:endParaRPr lang="en-AU"/>
           </a:p>
         </p:txBody>
       </p:sp>
@@ -4104,14 +4104,14 @@
             <p:ph idx="1"/>
             <p:extLst>
               <p:ext uri="{D42A27DB-BD31-4B8C-83A1-F6EECF244321}">
-                <p14:modId xmlns:p14="http://schemas.microsoft.com/office/powerpoint/2010/main" val="920436702"/>
+                <p14:modId xmlns:p14="http://schemas.microsoft.com/office/powerpoint/2010/main" val="3960146532"/>
               </p:ext>
             </p:extLst>
           </p:nvPr>
         </p:nvGraphicFramePr>
         <p:xfrm>
           <a:off x="838200" y="1825625"/>
-          <a:ext cx="10725150" cy="3881120"/>
+          <a:ext cx="10725150" cy="3510280"/>
         </p:xfrm>
         <a:graphic>
           <a:graphicData uri="http://schemas.openxmlformats.org/drawingml/2006/table">
@@ -4378,15 +4378,15 @@
                         <a:rPr lang="en-AU" sz="1400" b="0" dirty="0">
                           <a:hlinkClick r:id="rId4"/>
                         </a:rPr>
-                        <a:t>T1059</a:t>
+                        <a:t>T1070.001</a:t>
                       </a:r>
                       <a:r>
                         <a:rPr lang="en-AU" sz="1400" b="0" dirty="0"/>
                         <a:t> </a:t>
                       </a:r>
                       <a:r>
-                        <a:rPr lang="en-GB" sz="1400" b="0" dirty="0"/>
-                        <a:t>cmd.exe</a:t>
+                        <a:rPr lang="en-AU" sz="1400" dirty="0"/>
+                        <a:t>wevtutil.exe</a:t>
                       </a:r>
                       <a:endParaRPr lang="en-AU" sz="1400" b="0" dirty="0"/>
                     </a:p>
@@ -4398,6 +4398,24 @@
                     <a:bodyPr/>
                     <a:lstStyle/>
                     <a:p>
+                      <a:r>
+                        <a:rPr lang="en-AU" sz="1400" dirty="0"/>
+                        <a:t>for /F \”tokens=*\” %1 in (‘wevtutil.exe </a:t>
+                      </a:r>
+                      <a:r>
+                        <a:rPr lang="en-AU" sz="1400" dirty="0" err="1"/>
+                        <a:t>el</a:t>
+                      </a:r>
+                      <a:r>
+                        <a:rPr lang="en-AU" sz="1400" dirty="0"/>
+                        <a:t>’) DO wevtutil.exe cl \”%1\”</a:t>
+                      </a:r>
+                    </a:p>
+                    <a:p>
+                      <a:r>
+                        <a:rPr lang="en-AU" sz="1400" dirty="0"/>
+                        <a:t>(Microsoft Threat Intelligence, 2022)</a:t>
+                      </a:r>
                       <a:endParaRPr lang="en-AU" sz="1400" b="0" dirty="0"/>
                     </a:p>
                   </a:txBody>
@@ -4506,82 +4524,6 @@
                   </a:ext>
                 </a:extLst>
               </a:tr>
-              <a:tr h="370840">
-                <a:tc>
-                  <a:txBody>
-                    <a:bodyPr/>
-                    <a:lstStyle/>
-                    <a:p>
-                      <a:pPr marL="0" marR="0" lvl="0" indent="0" algn="l" defTabSz="914400" rtl="0" eaLnBrk="1" fontAlgn="auto" latinLnBrk="0" hangingPunct="1">
-                        <a:lnSpc>
-                          <a:spcPct val="100000"/>
-                        </a:lnSpc>
-                        <a:spcBef>
-                          <a:spcPts val="0"/>
-                        </a:spcBef>
-                        <a:spcAft>
-                          <a:spcPts val="0"/>
-                        </a:spcAft>
-                        <a:buClrTx/>
-                        <a:buSzTx/>
-                        <a:buFontTx/>
-                        <a:buNone/>
-                        <a:tabLst/>
-                        <a:defRPr/>
-                      </a:pPr>
-                      <a:r>
-                        <a:rPr lang="en-AU" sz="1400" b="0" dirty="0">
-                          <a:hlinkClick r:id="rId6"/>
-                        </a:rPr>
-                        <a:t>T1070.001</a:t>
-                      </a:r>
-                      <a:r>
-                        <a:rPr lang="en-AU" sz="1400" b="0" dirty="0"/>
-                        <a:t> </a:t>
-                      </a:r>
-                      <a:r>
-                        <a:rPr lang="en-AU" sz="1400" dirty="0"/>
-                        <a:t>wevtutil.exe</a:t>
-                      </a:r>
-                      <a:endParaRPr lang="en-AU" sz="1400" b="0" dirty="0"/>
-                    </a:p>
-                  </a:txBody>
-                  <a:tcPr/>
-                </a:tc>
-                <a:tc>
-                  <a:txBody>
-                    <a:bodyPr/>
-                    <a:lstStyle/>
-                    <a:p>
-                      <a:r>
-                        <a:rPr lang="en-AU" sz="1400" dirty="0"/>
-                        <a:t>for /F \”tokens=*\” %1 in (‘wevtutil.exe </a:t>
-                      </a:r>
-                      <a:r>
-                        <a:rPr lang="en-AU" sz="1400" dirty="0" err="1"/>
-                        <a:t>el</a:t>
-                      </a:r>
-                      <a:r>
-                        <a:rPr lang="en-AU" sz="1400" dirty="0"/>
-                        <a:t>’) DO wevtutil.exe cl \”%1\”</a:t>
-                      </a:r>
-                    </a:p>
-                    <a:p>
-                      <a:r>
-                        <a:rPr lang="en-AU" sz="1400" dirty="0"/>
-                        <a:t>(Microsoft Threat Intelligence, 2022)</a:t>
-                      </a:r>
-                      <a:endParaRPr lang="en-AU" sz="1400" b="0" dirty="0"/>
-                    </a:p>
-                  </a:txBody>
-                  <a:tcPr/>
-                </a:tc>
-                <a:extLst>
-                  <a:ext uri="{0D108BD9-81ED-4DB2-BD59-A6C34878D82A}">
-                    <a16:rowId xmlns:a16="http://schemas.microsoft.com/office/drawing/2014/main" val="3017645894"/>
-                  </a:ext>
-                </a:extLst>
-              </a:tr>
             </a:tbl>
           </a:graphicData>
         </a:graphic>
@@ -4600,6 +4542,143 @@
 </file>
 
 <file path=ppt/slides/slide4.xml><?xml version="1.0" encoding="utf-8"?>
+<p:sld xmlns:a="http://schemas.openxmlformats.org/drawingml/2006/main" xmlns:r="http://schemas.openxmlformats.org/officeDocument/2006/relationships" xmlns:p="http://schemas.openxmlformats.org/presentationml/2006/main">
+  <p:cSld>
+    <p:spTree>
+      <p:nvGrpSpPr>
+        <p:cNvPr id="1" name=""/>
+        <p:cNvGrpSpPr/>
+        <p:nvPr/>
+      </p:nvGrpSpPr>
+      <p:grpSpPr>
+        <a:xfrm>
+          <a:off x="0" y="0"/>
+          <a:ext cx="0" cy="0"/>
+          <a:chOff x="0" y="0"/>
+          <a:chExt cx="0" cy="0"/>
+        </a:xfrm>
+      </p:grpSpPr>
+      <p:sp>
+        <p:nvSpPr>
+          <p:cNvPr id="2" name="Title 1">
+            <a:extLst>
+              <a:ext uri="{FF2B5EF4-FFF2-40B4-BE49-F238E27FC236}">
+                <a16:creationId xmlns:a16="http://schemas.microsoft.com/office/drawing/2014/main" id="{90A4C70D-8AB6-3412-A9E3-594A7DAD279D}"/>
+              </a:ext>
+            </a:extLst>
+          </p:cNvPr>
+          <p:cNvSpPr>
+            <a:spLocks noGrp="1"/>
+          </p:cNvSpPr>
+          <p:nvPr>
+            <p:ph type="title"/>
+          </p:nvPr>
+        </p:nvSpPr>
+        <p:spPr/>
+        <p:txBody>
+          <a:bodyPr/>
+          <a:lstStyle/>
+          <a:p>
+            <a:r>
+              <a:rPr lang="en-AU" sz="4400" dirty="0">
+                <a:hlinkClick r:id="rId2"/>
+              </a:rPr>
+              <a:t>T1490</a:t>
+            </a:r>
+            <a:r>
+              <a:rPr lang="en-AU" sz="4400" dirty="0"/>
+              <a:t> </a:t>
+            </a:r>
+            <a:r>
+              <a:rPr lang="en-AU" dirty="0"/>
+              <a:t>Inhibit System Recovery </a:t>
+            </a:r>
+            <a:br>
+              <a:rPr lang="en-AU" dirty="0"/>
+            </a:br>
+            <a:endParaRPr lang="en-AU" dirty="0"/>
+          </a:p>
+        </p:txBody>
+      </p:sp>
+      <p:pic>
+        <p:nvPicPr>
+          <p:cNvPr id="7" name="Picture 6">
+            <a:extLst>
+              <a:ext uri="{FF2B5EF4-FFF2-40B4-BE49-F238E27FC236}">
+                <a16:creationId xmlns:a16="http://schemas.microsoft.com/office/drawing/2014/main" id="{C5CAD526-2F0C-9002-D56D-89F78705607C}"/>
+              </a:ext>
+            </a:extLst>
+          </p:cNvPr>
+          <p:cNvPicPr>
+            <a:picLocks noChangeAspect="1"/>
+          </p:cNvPicPr>
+          <p:nvPr/>
+        </p:nvPicPr>
+        <p:blipFill>
+          <a:blip r:embed="rId3"/>
+          <a:stretch>
+            <a:fillRect/>
+          </a:stretch>
+        </p:blipFill>
+        <p:spPr>
+          <a:xfrm>
+            <a:off x="0" y="2936200"/>
+            <a:ext cx="3902330" cy="3915209"/>
+          </a:xfrm>
+          <a:prstGeom prst="rect">
+            <a:avLst/>
+          </a:prstGeom>
+        </p:spPr>
+      </p:pic>
+      <p:sp>
+        <p:nvSpPr>
+          <p:cNvPr id="8" name="TextBox 7">
+            <a:extLst>
+              <a:ext uri="{FF2B5EF4-FFF2-40B4-BE49-F238E27FC236}">
+                <a16:creationId xmlns:a16="http://schemas.microsoft.com/office/drawing/2014/main" id="{4EB107DB-0E5E-BC67-894E-ECA2C1DA86E0}"/>
+              </a:ext>
+            </a:extLst>
+          </p:cNvPr>
+          <p:cNvSpPr txBox="1"/>
+          <p:nvPr/>
+        </p:nvSpPr>
+        <p:spPr>
+          <a:xfrm>
+            <a:off x="0" y="1987550"/>
+            <a:ext cx="3902330" cy="646331"/>
+          </a:xfrm>
+          <a:prstGeom prst="rect">
+            <a:avLst/>
+          </a:prstGeom>
+          <a:noFill/>
+        </p:spPr>
+        <p:txBody>
+          <a:bodyPr wrap="square" rtlCol="0">
+            <a:spAutoFit/>
+          </a:bodyPr>
+          <a:lstStyle/>
+          <a:p>
+            <a:r>
+              <a:rPr lang="en-AU" dirty="0"/>
+              <a:t>Had to enable shadow copies first for the attack to be successful</a:t>
+            </a:r>
+          </a:p>
+        </p:txBody>
+      </p:sp>
+    </p:spTree>
+    <p:extLst>
+      <p:ext uri="{BB962C8B-B14F-4D97-AF65-F5344CB8AC3E}">
+        <p14:creationId xmlns:p14="http://schemas.microsoft.com/office/powerpoint/2010/main" val="3794003486"/>
+      </p:ext>
+    </p:extLst>
+  </p:cSld>
+  <p:clrMapOvr>
+    <a:masterClrMapping/>
+  </p:clrMapOvr>
+</p:sld>
+</file>
+
+<file path=ppt/slides/slide5.xml><?xml version="1.0" encoding="utf-8"?>
 <p:sld xmlns:a="http://schemas.openxmlformats.org/drawingml/2006/main" xmlns:r="http://schemas.openxmlformats.org/officeDocument/2006/relationships" xmlns:p="http://schemas.openxmlformats.org/presentationml/2006/main">
   <p:cSld>
     <p:spTree>

</xml_diff>

<commit_message>
added pstools, update evidence
</commit_message>
<xml_diff>
--- a/evidence.pptx
+++ b/evidence.pptx
@@ -9,7 +9,8 @@
     <p:sldId id="257" r:id="rId3"/>
     <p:sldId id="259" r:id="rId4"/>
     <p:sldId id="260" r:id="rId5"/>
-    <p:sldId id="258" r:id="rId6"/>
+    <p:sldId id="261" r:id="rId6"/>
+    <p:sldId id="258" r:id="rId7"/>
   </p:sldIdLst>
   <p:sldSz cx="12192000" cy="6858000"/>
   <p:notesSz cx="6858000" cy="9144000"/>
@@ -4853,6 +4854,123 @@
           <p:cNvPr id="2" name="Title 1">
             <a:extLst>
               <a:ext uri="{FF2B5EF4-FFF2-40B4-BE49-F238E27FC236}">
+                <a16:creationId xmlns:a16="http://schemas.microsoft.com/office/drawing/2014/main" id="{8A593D04-D302-066F-3889-7BAA00DF47A4}"/>
+              </a:ext>
+            </a:extLst>
+          </p:cNvPr>
+          <p:cNvSpPr>
+            <a:spLocks noGrp="1"/>
+          </p:cNvSpPr>
+          <p:nvPr>
+            <p:ph type="title"/>
+          </p:nvPr>
+        </p:nvSpPr>
+        <p:spPr/>
+        <p:txBody>
+          <a:bodyPr/>
+          <a:lstStyle/>
+          <a:p>
+            <a:r>
+              <a:rPr lang="en-AU" dirty="0" err="1"/>
+              <a:t>PsExec</a:t>
+            </a:r>
+            <a:endParaRPr lang="en-AU" dirty="0"/>
+          </a:p>
+        </p:txBody>
+      </p:sp>
+      <p:sp>
+        <p:nvSpPr>
+          <p:cNvPr id="3" name="Content Placeholder 2">
+            <a:extLst>
+              <a:ext uri="{FF2B5EF4-FFF2-40B4-BE49-F238E27FC236}">
+                <a16:creationId xmlns:a16="http://schemas.microsoft.com/office/drawing/2014/main" id="{B9629E02-08BB-E64B-7466-C09D07ED138E}"/>
+              </a:ext>
+            </a:extLst>
+          </p:cNvPr>
+          <p:cNvSpPr>
+            <a:spLocks noGrp="1"/>
+          </p:cNvSpPr>
+          <p:nvPr>
+            <p:ph idx="1"/>
+          </p:nvPr>
+        </p:nvSpPr>
+        <p:spPr/>
+        <p:txBody>
+          <a:bodyPr/>
+          <a:lstStyle/>
+          <a:p>
+            <a:r>
+              <a:rPr lang="en-AU" dirty="0" err="1"/>
+              <a:t>BlackCat</a:t>
+            </a:r>
+            <a:r>
+              <a:rPr lang="en-AU" dirty="0"/>
+              <a:t> will have </a:t>
+            </a:r>
+            <a:r>
+              <a:rPr lang="en-AU" dirty="0" err="1"/>
+              <a:t>PsExec</a:t>
+            </a:r>
+            <a:r>
+              <a:rPr lang="en-AU" dirty="0"/>
+              <a:t> bundled into the executable however </a:t>
+            </a:r>
+            <a:r>
+              <a:rPr lang="en-AU" dirty="0" err="1"/>
+              <a:t>PsExec</a:t>
+            </a:r>
+            <a:r>
+              <a:rPr lang="en-AU" dirty="0"/>
+              <a:t> can be download from </a:t>
+            </a:r>
+            <a:r>
+              <a:rPr lang="en-AU" dirty="0">
+                <a:hlinkClick r:id="rId2"/>
+              </a:rPr>
+              <a:t>here</a:t>
+            </a:r>
+            <a:r>
+              <a:rPr lang="en-AU" dirty="0"/>
+              <a:t> .</a:t>
+            </a:r>
+          </a:p>
+        </p:txBody>
+      </p:sp>
+    </p:spTree>
+    <p:extLst>
+      <p:ext uri="{BB962C8B-B14F-4D97-AF65-F5344CB8AC3E}">
+        <p14:creationId xmlns:p14="http://schemas.microsoft.com/office/powerpoint/2010/main" val="362416721"/>
+      </p:ext>
+    </p:extLst>
+  </p:cSld>
+  <p:clrMapOvr>
+    <a:masterClrMapping/>
+  </p:clrMapOvr>
+</p:sld>
+</file>
+
+<file path=ppt/slides/slide6.xml><?xml version="1.0" encoding="utf-8"?>
+<p:sld xmlns:a="http://schemas.openxmlformats.org/drawingml/2006/main" xmlns:r="http://schemas.openxmlformats.org/officeDocument/2006/relationships" xmlns:p="http://schemas.openxmlformats.org/presentationml/2006/main">
+  <p:cSld>
+    <p:spTree>
+      <p:nvGrpSpPr>
+        <p:cNvPr id="1" name=""/>
+        <p:cNvGrpSpPr/>
+        <p:nvPr/>
+      </p:nvGrpSpPr>
+      <p:grpSpPr>
+        <a:xfrm>
+          <a:off x="0" y="0"/>
+          <a:ext cx="0" cy="0"/>
+          <a:chOff x="0" y="0"/>
+          <a:chExt cx="0" cy="0"/>
+        </a:xfrm>
+      </p:grpSpPr>
+      <p:sp>
+        <p:nvSpPr>
+          <p:cNvPr id="2" name="Title 1">
+            <a:extLst>
+              <a:ext uri="{FF2B5EF4-FFF2-40B4-BE49-F238E27FC236}">
                 <a16:creationId xmlns:a16="http://schemas.microsoft.com/office/drawing/2014/main" id="{E8BA4E43-19C5-02C9-ED26-8AF7FED21CED}"/>
               </a:ext>
             </a:extLst>

</xml_diff>

<commit_message>
added net use detections
</commit_message>
<xml_diff>
--- a/evidence.pptx
+++ b/evidence.pptx
@@ -10,7 +10,8 @@
     <p:sldId id="259" r:id="rId4"/>
     <p:sldId id="260" r:id="rId5"/>
     <p:sldId id="261" r:id="rId6"/>
-    <p:sldId id="258" r:id="rId7"/>
+    <p:sldId id="262" r:id="rId7"/>
+    <p:sldId id="258" r:id="rId8"/>
   </p:sldIdLst>
   <p:sldSz cx="12192000" cy="6858000"/>
   <p:notesSz cx="6858000" cy="9144000"/>
@@ -4097,7 +4098,7 @@
             <p:ph idx="1"/>
             <p:extLst>
               <p:ext uri="{D42A27DB-BD31-4B8C-83A1-F6EECF244321}">
-                <p14:modId xmlns:p14="http://schemas.microsoft.com/office/powerpoint/2010/main" val="3960146532"/>
+                <p14:modId xmlns:p14="http://schemas.microsoft.com/office/powerpoint/2010/main" val="2965059544"/>
               </p:ext>
             </p:extLst>
           </p:nvPr>
@@ -4871,6 +4872,12 @@
           <a:lstStyle/>
           <a:p>
             <a:r>
+              <a:rPr lang="en-AU" sz="4400" b="0" dirty="0">
+                <a:hlinkClick r:id="rId2"/>
+              </a:rPr>
+              <a:t>T1570 </a:t>
+            </a:r>
+            <a:r>
               <a:rPr lang="en-AU" dirty="0" err="1"/>
               <a:t>PsExec</a:t>
             </a:r>
@@ -4925,7 +4932,7 @@
             </a:r>
             <a:r>
               <a:rPr lang="en-AU" dirty="0">
-                <a:hlinkClick r:id="rId2"/>
+                <a:hlinkClick r:id="rId3"/>
               </a:rPr>
               <a:t>here</a:t>
             </a:r>
@@ -4937,7 +4944,7 @@
           <a:p>
             <a:r>
               <a:rPr lang="en-AU" sz="2800" b="0" dirty="0">
-                <a:hlinkClick r:id="rId3"/>
+                <a:hlinkClick r:id="rId2"/>
               </a:rPr>
               <a:t>T1570</a:t>
             </a:r>
@@ -5070,6 +5077,152 @@
 </file>
 
 <file path=ppt/slides/slide6.xml><?xml version="1.0" encoding="utf-8"?>
+<p:sld xmlns:a="http://schemas.openxmlformats.org/drawingml/2006/main" xmlns:r="http://schemas.openxmlformats.org/officeDocument/2006/relationships" xmlns:p="http://schemas.openxmlformats.org/presentationml/2006/main">
+  <p:cSld>
+    <p:spTree>
+      <p:nvGrpSpPr>
+        <p:cNvPr id="1" name=""/>
+        <p:cNvGrpSpPr/>
+        <p:nvPr/>
+      </p:nvGrpSpPr>
+      <p:grpSpPr>
+        <a:xfrm>
+          <a:off x="0" y="0"/>
+          <a:ext cx="0" cy="0"/>
+          <a:chOff x="0" y="0"/>
+          <a:chExt cx="0" cy="0"/>
+        </a:xfrm>
+      </p:grpSpPr>
+      <p:sp>
+        <p:nvSpPr>
+          <p:cNvPr id="2" name="Title 1">
+            <a:extLst>
+              <a:ext uri="{FF2B5EF4-FFF2-40B4-BE49-F238E27FC236}">
+                <a16:creationId xmlns:a16="http://schemas.microsoft.com/office/drawing/2014/main" id="{C79178F3-F4BA-D0D3-3A46-E78A7247D7C8}"/>
+              </a:ext>
+            </a:extLst>
+          </p:cNvPr>
+          <p:cNvSpPr>
+            <a:spLocks noGrp="1"/>
+          </p:cNvSpPr>
+          <p:nvPr>
+            <p:ph type="title"/>
+          </p:nvPr>
+        </p:nvSpPr>
+        <p:spPr/>
+        <p:txBody>
+          <a:bodyPr/>
+          <a:lstStyle/>
+          <a:p>
+            <a:r>
+              <a:rPr lang="en-AU" sz="4400" b="0" dirty="0">
+                <a:hlinkClick r:id="rId2"/>
+              </a:rPr>
+              <a:t>T1033 </a:t>
+            </a:r>
+            <a:r>
+              <a:rPr lang="en-AU" sz="4400" b="0" dirty="0"/>
+              <a:t> </a:t>
+            </a:r>
+            <a:r>
+              <a:rPr lang="en-AU" dirty="0"/>
+              <a:t>Net Use</a:t>
+            </a:r>
+          </a:p>
+        </p:txBody>
+      </p:sp>
+      <p:sp>
+        <p:nvSpPr>
+          <p:cNvPr id="3" name="Content Placeholder 2">
+            <a:extLst>
+              <a:ext uri="{FF2B5EF4-FFF2-40B4-BE49-F238E27FC236}">
+                <a16:creationId xmlns:a16="http://schemas.microsoft.com/office/drawing/2014/main" id="{028EF4B6-CB90-54BF-23B5-0ED9C0E7D91E}"/>
+              </a:ext>
+            </a:extLst>
+          </p:cNvPr>
+          <p:cNvSpPr>
+            <a:spLocks noGrp="1"/>
+          </p:cNvSpPr>
+          <p:nvPr>
+            <p:ph idx="1"/>
+          </p:nvPr>
+        </p:nvSpPr>
+        <p:spPr/>
+        <p:txBody>
+          <a:bodyPr>
+            <a:normAutofit/>
+          </a:bodyPr>
+          <a:lstStyle/>
+          <a:p>
+            <a:r>
+              <a:rPr lang="en-GB" sz="1600" dirty="0"/>
+              <a:t>net use \\[computer name]  /user:[domain]\[user] [password] /</a:t>
+            </a:r>
+            <a:r>
+              <a:rPr lang="en-GB" sz="1600" dirty="0" err="1"/>
+              <a:t>persistent:no</a:t>
+            </a:r>
+            <a:r>
+              <a:rPr lang="en-GB" sz="1600" dirty="0"/>
+              <a:t> </a:t>
+            </a:r>
+          </a:p>
+          <a:p>
+            <a:r>
+              <a:rPr lang="en-AU" sz="1600" dirty="0" err="1"/>
+              <a:t>BlackCat</a:t>
+            </a:r>
+            <a:r>
+              <a:rPr lang="en-AU" sz="1600" dirty="0"/>
+              <a:t> uses the net use command to connect to remote drives, this command is slightly more likely to be used by legitimate process or users so there may be some false positives. To reduce false positives the </a:t>
+            </a:r>
+            <a:r>
+              <a:rPr lang="en-AU" sz="1600" dirty="0" err="1"/>
+              <a:t>wazuh</a:t>
+            </a:r>
+            <a:r>
+              <a:rPr lang="en-AU" sz="1600" dirty="0"/>
+              <a:t> rule will look for net use and /</a:t>
+            </a:r>
+            <a:r>
+              <a:rPr lang="en-AU" sz="1600" dirty="0" err="1"/>
+              <a:t>persistent:no</a:t>
+            </a:r>
+            <a:r>
+              <a:rPr lang="en-AU" sz="1600" dirty="0"/>
+              <a:t> it is unlikely for a user adding a network drive to specifically turn persistence off. If that’s the case its still worth raising an alert.</a:t>
+            </a:r>
+          </a:p>
+          <a:p>
+            <a:r>
+              <a:rPr lang="en-AU" sz="1600" dirty="0"/>
+              <a:t>In order to reduce the possibility of command being formatted in a way that prevents detection our </a:t>
+            </a:r>
+            <a:r>
+              <a:rPr lang="en-AU" sz="1600" dirty="0" err="1"/>
+              <a:t>wazuh</a:t>
+            </a:r>
+            <a:r>
+              <a:rPr lang="en-AU" sz="1600" dirty="0"/>
+              <a:t> rule will look for a command that has “net use”, “persistent” and “no” in the command. </a:t>
+            </a:r>
+          </a:p>
+        </p:txBody>
+      </p:sp>
+    </p:spTree>
+    <p:extLst>
+      <p:ext uri="{BB962C8B-B14F-4D97-AF65-F5344CB8AC3E}">
+        <p14:creationId xmlns:p14="http://schemas.microsoft.com/office/powerpoint/2010/main" val="2786465426"/>
+      </p:ext>
+    </p:extLst>
+  </p:cSld>
+  <p:clrMapOvr>
+    <a:masterClrMapping/>
+  </p:clrMapOvr>
+</p:sld>
+</file>
+
+<file path=ppt/slides/slide7.xml><?xml version="1.0" encoding="utf-8"?>
 <p:sld xmlns:a="http://schemas.openxmlformats.org/drawingml/2006/main" xmlns:r="http://schemas.openxmlformats.org/officeDocument/2006/relationships" xmlns:p="http://schemas.openxmlformats.org/presentationml/2006/main">
   <p:cSld>
     <p:spTree>

</xml_diff>

<commit_message>
added evidence for net use
</commit_message>
<xml_diff>
--- a/evidence.pptx
+++ b/evidence.pptx
@@ -5211,10 +5211,10 @@
       </p:sp>
       <p:pic>
         <p:nvPicPr>
-          <p:cNvPr id="5" name="Picture 4">
-            <a:extLst>
-              <a:ext uri="{FF2B5EF4-FFF2-40B4-BE49-F238E27FC236}">
-                <a16:creationId xmlns:a16="http://schemas.microsoft.com/office/drawing/2014/main" id="{74B76C74-CA74-D752-BBAD-244E56D80AC1}"/>
+          <p:cNvPr id="7" name="Picture 6">
+            <a:extLst>
+              <a:ext uri="{FF2B5EF4-FFF2-40B4-BE49-F238E27FC236}">
+                <a16:creationId xmlns:a16="http://schemas.microsoft.com/office/drawing/2014/main" id="{40A9D5B4-A4FF-480D-3779-54C07961CE15}"/>
               </a:ext>
             </a:extLst>
           </p:cNvPr>
@@ -5231,8 +5231,8 @@
         </p:blipFill>
         <p:spPr>
           <a:xfrm>
-            <a:off x="0" y="3814912"/>
-            <a:ext cx="12192000" cy="912120"/>
+            <a:off x="0" y="3753495"/>
+            <a:ext cx="12192000" cy="1071170"/>
           </a:xfrm>
           <a:prstGeom prst="rect">
             <a:avLst/>

</xml_diff>

<commit_message>
added rule to catch log clears
</commit_message>
<xml_diff>
--- a/evidence.pptx
+++ b/evidence.pptx
@@ -11,7 +11,8 @@
     <p:sldId id="260" r:id="rId5"/>
     <p:sldId id="261" r:id="rId6"/>
     <p:sldId id="262" r:id="rId7"/>
-    <p:sldId id="258" r:id="rId8"/>
+    <p:sldId id="263" r:id="rId8"/>
+    <p:sldId id="258" r:id="rId9"/>
   </p:sldIdLst>
   <p:sldSz cx="12192000" cy="6858000"/>
   <p:notesSz cx="6858000" cy="9144000"/>
@@ -5274,6 +5275,211 @@
           <p:cNvPr id="2" name="Title 1">
             <a:extLst>
               <a:ext uri="{FF2B5EF4-FFF2-40B4-BE49-F238E27FC236}">
+                <a16:creationId xmlns:a16="http://schemas.microsoft.com/office/drawing/2014/main" id="{F4A4AB63-F8E5-04BB-8FD8-C35283288B2E}"/>
+              </a:ext>
+            </a:extLst>
+          </p:cNvPr>
+          <p:cNvSpPr>
+            <a:spLocks noGrp="1"/>
+          </p:cNvSpPr>
+          <p:nvPr>
+            <p:ph type="title"/>
+          </p:nvPr>
+        </p:nvSpPr>
+        <p:spPr/>
+        <p:txBody>
+          <a:bodyPr/>
+          <a:lstStyle/>
+          <a:p>
+            <a:r>
+              <a:rPr lang="en-AU" sz="4400" b="0" dirty="0">
+                <a:hlinkClick r:id="rId2"/>
+              </a:rPr>
+              <a:t>T1070.001</a:t>
+            </a:r>
+            <a:r>
+              <a:rPr lang="en-AU" sz="4400" b="0" dirty="0"/>
+              <a:t> </a:t>
+            </a:r>
+            <a:r>
+              <a:rPr lang="en-AU" sz="4400" dirty="0"/>
+              <a:t>wevtutil.exe</a:t>
+            </a:r>
+            <a:endParaRPr lang="en-AU" dirty="0"/>
+          </a:p>
+        </p:txBody>
+      </p:sp>
+      <p:sp>
+        <p:nvSpPr>
+          <p:cNvPr id="3" name="Content Placeholder 2">
+            <a:extLst>
+              <a:ext uri="{FF2B5EF4-FFF2-40B4-BE49-F238E27FC236}">
+                <a16:creationId xmlns:a16="http://schemas.microsoft.com/office/drawing/2014/main" id="{755FC6F4-DB97-96DB-148F-F1DFBECB7C4C}"/>
+              </a:ext>
+            </a:extLst>
+          </p:cNvPr>
+          <p:cNvSpPr>
+            <a:spLocks noGrp="1"/>
+          </p:cNvSpPr>
+          <p:nvPr>
+            <p:ph idx="1"/>
+          </p:nvPr>
+        </p:nvSpPr>
+        <p:spPr/>
+        <p:txBody>
+          <a:bodyPr>
+            <a:normAutofit fontScale="92500" lnSpcReduction="20000"/>
+          </a:bodyPr>
+          <a:lstStyle/>
+          <a:p>
+            <a:r>
+              <a:rPr lang="en-AU" sz="2800" dirty="0"/>
+              <a:t>for /F \”tokens=*\” %1 in (‘wevtutil.exe </a:t>
+            </a:r>
+            <a:r>
+              <a:rPr lang="en-AU" sz="2800" dirty="0" err="1"/>
+              <a:t>el</a:t>
+            </a:r>
+            <a:r>
+              <a:rPr lang="en-AU" sz="2800" dirty="0"/>
+              <a:t>’) DO wevtutil.exe cl \”%1\”</a:t>
+            </a:r>
+          </a:p>
+          <a:p>
+            <a:r>
+              <a:rPr lang="en-AU" dirty="0"/>
+              <a:t>This command doesn’t in the testing environment however in </a:t>
+            </a:r>
+            <a:r>
+              <a:rPr lang="en-AU" dirty="0" err="1"/>
+              <a:t>powershell</a:t>
+            </a:r>
+            <a:r>
+              <a:rPr lang="en-AU" dirty="0"/>
+              <a:t> you can achieve the same outcome using </a:t>
+            </a:r>
+            <a:r>
+              <a:rPr lang="en-AU" dirty="0" err="1"/>
+              <a:t>wevtutil</a:t>
+            </a:r>
+            <a:r>
+              <a:rPr lang="en-AU" dirty="0"/>
+              <a:t> witch this command.</a:t>
+            </a:r>
+          </a:p>
+          <a:p>
+            <a:r>
+              <a:rPr lang="en-AU" dirty="0" err="1"/>
+              <a:t>wevtutil</a:t>
+            </a:r>
+            <a:r>
+              <a:rPr lang="en-AU" dirty="0"/>
+              <a:t> </a:t>
+            </a:r>
+            <a:r>
+              <a:rPr lang="en-AU" dirty="0" err="1"/>
+              <a:t>el</a:t>
+            </a:r>
+            <a:r>
+              <a:rPr lang="en-AU" dirty="0"/>
+              <a:t> | Foreach-Object {</a:t>
+            </a:r>
+            <a:r>
+              <a:rPr lang="en-AU" dirty="0" err="1"/>
+              <a:t>wevtutil</a:t>
+            </a:r>
+            <a:r>
+              <a:rPr lang="en-AU" dirty="0"/>
+              <a:t> cl "$_"}</a:t>
+            </a:r>
+          </a:p>
+          <a:p>
+            <a:r>
+              <a:rPr lang="en-AU" dirty="0"/>
+              <a:t>Despite it clearing logs Sysmon will still catch it until it fully clears the logs allowing </a:t>
+            </a:r>
+            <a:r>
+              <a:rPr lang="en-AU" dirty="0" err="1"/>
+              <a:t>Wazuh</a:t>
+            </a:r>
+            <a:r>
+              <a:rPr lang="en-AU" dirty="0"/>
+              <a:t> to generate a alert.</a:t>
+            </a:r>
+          </a:p>
+          <a:p>
+            <a:r>
+              <a:rPr lang="en-AU" dirty="0"/>
+              <a:t>You can prevent the logs from being cleared either by group policy from the domain controller. This can be circumvented sometimes if the user or </a:t>
+            </a:r>
+            <a:r>
+              <a:rPr lang="en-AU" dirty="0" err="1"/>
+              <a:t>BlackCat</a:t>
+            </a:r>
+            <a:r>
+              <a:rPr lang="en-AU" dirty="0"/>
+              <a:t> can edit the registry they could undo the domain controller action then quickly remove logs before the group policy is updated again. </a:t>
+            </a:r>
+          </a:p>
+          <a:p>
+            <a:r>
+              <a:rPr lang="en-AU" dirty="0"/>
+              <a:t>A better solution would be some kind of remote logging server where logs are forwarded to. In this case the logs are forwarded to </a:t>
+            </a:r>
+            <a:r>
+              <a:rPr lang="en-AU" dirty="0" err="1"/>
+              <a:t>Wazuh</a:t>
+            </a:r>
+            <a:r>
+              <a:rPr lang="en-AU" dirty="0"/>
+              <a:t> </a:t>
+            </a:r>
+            <a:r>
+              <a:rPr lang="en-AU"/>
+              <a:t>and an </a:t>
+            </a:r>
+            <a:r>
+              <a:rPr lang="en-AU" dirty="0"/>
+              <a:t>event is triggered</a:t>
+            </a:r>
+          </a:p>
+        </p:txBody>
+      </p:sp>
+    </p:spTree>
+    <p:extLst>
+      <p:ext uri="{BB962C8B-B14F-4D97-AF65-F5344CB8AC3E}">
+        <p14:creationId xmlns:p14="http://schemas.microsoft.com/office/powerpoint/2010/main" val="2586304787"/>
+      </p:ext>
+    </p:extLst>
+  </p:cSld>
+  <p:clrMapOvr>
+    <a:masterClrMapping/>
+  </p:clrMapOvr>
+</p:sld>
+</file>
+
+<file path=ppt/slides/slide8.xml><?xml version="1.0" encoding="utf-8"?>
+<p:sld xmlns:a="http://schemas.openxmlformats.org/drawingml/2006/main" xmlns:r="http://schemas.openxmlformats.org/officeDocument/2006/relationships" xmlns:p="http://schemas.openxmlformats.org/presentationml/2006/main">
+  <p:cSld>
+    <p:spTree>
+      <p:nvGrpSpPr>
+        <p:cNvPr id="1" name=""/>
+        <p:cNvGrpSpPr/>
+        <p:nvPr/>
+      </p:nvGrpSpPr>
+      <p:grpSpPr>
+        <a:xfrm>
+          <a:off x="0" y="0"/>
+          <a:ext cx="0" cy="0"/>
+          <a:chOff x="0" y="0"/>
+          <a:chExt cx="0" cy="0"/>
+        </a:xfrm>
+      </p:grpSpPr>
+      <p:sp>
+        <p:nvSpPr>
+          <p:cNvPr id="2" name="Title 1">
+            <a:extLst>
+              <a:ext uri="{FF2B5EF4-FFF2-40B4-BE49-F238E27FC236}">
                 <a16:creationId xmlns:a16="http://schemas.microsoft.com/office/drawing/2014/main" id="{E8BA4E43-19C5-02C9-ED26-8AF7FED21CED}"/>
               </a:ext>
             </a:extLst>

</xml_diff>

<commit_message>
bug fix and testing added
</commit_message>
<xml_diff>
--- a/evidence.pptx
+++ b/evidence.pptx
@@ -13,7 +13,8 @@
     <p:sldId id="263" r:id="rId7"/>
     <p:sldId id="264" r:id="rId8"/>
     <p:sldId id="260" r:id="rId9"/>
-    <p:sldId id="258" r:id="rId10"/>
+    <p:sldId id="265" r:id="rId10"/>
+    <p:sldId id="258" r:id="rId11"/>
   </p:sldIdLst>
   <p:sldSz cx="12192000" cy="6858000"/>
   <p:notesSz cx="6858000" cy="9144000"/>
@@ -3431,6 +3432,396 @@
 </p:sld>
 </file>
 
+<file path=ppt/slides/slide10.xml><?xml version="1.0" encoding="utf-8"?>
+<p:sld xmlns:a="http://schemas.openxmlformats.org/drawingml/2006/main" xmlns:r="http://schemas.openxmlformats.org/officeDocument/2006/relationships" xmlns:p="http://schemas.openxmlformats.org/presentationml/2006/main">
+  <p:cSld>
+    <p:spTree>
+      <p:nvGrpSpPr>
+        <p:cNvPr id="1" name=""/>
+        <p:cNvGrpSpPr/>
+        <p:nvPr/>
+      </p:nvGrpSpPr>
+      <p:grpSpPr>
+        <a:xfrm>
+          <a:off x="0" y="0"/>
+          <a:ext cx="0" cy="0"/>
+          <a:chOff x="0" y="0"/>
+          <a:chExt cx="0" cy="0"/>
+        </a:xfrm>
+      </p:grpSpPr>
+      <p:sp>
+        <p:nvSpPr>
+          <p:cNvPr id="2" name="Title 1">
+            <a:extLst>
+              <a:ext uri="{FF2B5EF4-FFF2-40B4-BE49-F238E27FC236}">
+                <a16:creationId xmlns:a16="http://schemas.microsoft.com/office/drawing/2014/main" id="{E8BA4E43-19C5-02C9-ED26-8AF7FED21CED}"/>
+              </a:ext>
+            </a:extLst>
+          </p:cNvPr>
+          <p:cNvSpPr>
+            <a:spLocks noGrp="1"/>
+          </p:cNvSpPr>
+          <p:nvPr>
+            <p:ph type="title"/>
+          </p:nvPr>
+        </p:nvSpPr>
+        <p:spPr/>
+        <p:txBody>
+          <a:bodyPr/>
+          <a:lstStyle/>
+          <a:p>
+            <a:r>
+              <a:rPr lang="en-AU" dirty="0"/>
+              <a:t>References</a:t>
+            </a:r>
+          </a:p>
+        </p:txBody>
+      </p:sp>
+      <p:sp>
+        <p:nvSpPr>
+          <p:cNvPr id="3" name="Content Placeholder 2">
+            <a:extLst>
+              <a:ext uri="{FF2B5EF4-FFF2-40B4-BE49-F238E27FC236}">
+                <a16:creationId xmlns:a16="http://schemas.microsoft.com/office/drawing/2014/main" id="{B6A28169-F058-5AD3-E0C5-F60F9303105A}"/>
+              </a:ext>
+            </a:extLst>
+          </p:cNvPr>
+          <p:cNvSpPr>
+            <a:spLocks noGrp="1"/>
+          </p:cNvSpPr>
+          <p:nvPr>
+            <p:ph idx="1"/>
+          </p:nvPr>
+        </p:nvSpPr>
+        <p:spPr/>
+        <p:txBody>
+          <a:bodyPr>
+            <a:normAutofit/>
+          </a:bodyPr>
+          <a:lstStyle/>
+          <a:p>
+            <a:r>
+              <a:rPr lang="en-AU" sz="1200" dirty="0">
+                <a:effectLst/>
+              </a:rPr>
+              <a:t>ALPHV/</a:t>
+            </a:r>
+            <a:r>
+              <a:rPr lang="en-AU" sz="1200" dirty="0" err="1">
+                <a:effectLst/>
+              </a:rPr>
+              <a:t>BlackCat</a:t>
+            </a:r>
+            <a:r>
+              <a:rPr lang="en-AU" sz="1200" dirty="0">
+                <a:effectLst/>
+              </a:rPr>
+              <a:t> Ransomware, A.D.D.I. (2023) </a:t>
+            </a:r>
+            <a:r>
+              <a:rPr lang="en-AU" sz="1200" i="1" dirty="0">
+                <a:effectLst/>
+              </a:rPr>
+              <a:t>A deep dive into ALPHV/</a:t>
+            </a:r>
+            <a:r>
+              <a:rPr lang="en-AU" sz="1200" i="1" dirty="0" err="1">
+                <a:effectLst/>
+              </a:rPr>
+              <a:t>BlackCat</a:t>
+            </a:r>
+            <a:r>
+              <a:rPr lang="en-AU" sz="1200" i="1" dirty="0">
+                <a:effectLst/>
+              </a:rPr>
+              <a:t> ransomware</a:t>
+            </a:r>
+            <a:r>
+              <a:rPr lang="en-AU" sz="1200" dirty="0">
+                <a:effectLst/>
+              </a:rPr>
+              <a:t>, </a:t>
+            </a:r>
+            <a:r>
+              <a:rPr lang="en-AU" sz="1200" i="1" dirty="0" err="1">
+                <a:effectLst/>
+              </a:rPr>
+              <a:t>SecurityScorecard</a:t>
+            </a:r>
+            <a:r>
+              <a:rPr lang="en-AU" sz="1200" dirty="0">
+                <a:effectLst/>
+              </a:rPr>
+              <a:t>. Available at: https://securityscorecard.com/research/deep-dive-into-alphv-blackcat-ransomware/ (Accessed: 22 September 2023). </a:t>
+            </a:r>
+          </a:p>
+          <a:p>
+            <a:r>
+              <a:rPr lang="en-AU" sz="1200" dirty="0" err="1">
+                <a:effectLst/>
+              </a:rPr>
+              <a:t>Bouchrika</a:t>
+            </a:r>
+            <a:r>
+              <a:rPr lang="en-AU" sz="1200" dirty="0">
+                <a:effectLst/>
+              </a:rPr>
+              <a:t>, I. (2023) </a:t>
+            </a:r>
+            <a:r>
+              <a:rPr lang="en-AU" sz="1200" i="1" dirty="0" err="1">
+                <a:effectLst/>
+              </a:rPr>
+              <a:t>BlackCat</a:t>
+            </a:r>
+            <a:r>
+              <a:rPr lang="en-AU" sz="1200" i="1" dirty="0">
+                <a:effectLst/>
+              </a:rPr>
+              <a:t> ransomware (ALPHV)</a:t>
+            </a:r>
+            <a:r>
+              <a:rPr lang="en-AU" sz="1200" dirty="0">
+                <a:effectLst/>
+              </a:rPr>
+              <a:t>, </a:t>
+            </a:r>
+            <a:r>
+              <a:rPr lang="en-AU" sz="1200" i="1" dirty="0">
+                <a:effectLst/>
+              </a:rPr>
+              <a:t>Varonis</a:t>
+            </a:r>
+            <a:r>
+              <a:rPr lang="en-AU" sz="1200" dirty="0">
+                <a:effectLst/>
+              </a:rPr>
+              <a:t>. Available at: https://www.varonis.com/blog/blackcat-ransomware (Accessed: 22 September 2023). </a:t>
+            </a:r>
+          </a:p>
+          <a:p>
+            <a:r>
+              <a:rPr lang="en-AU" sz="1200" dirty="0">
+                <a:effectLst/>
+              </a:rPr>
+              <a:t>Clark, A., Sivakumaran, P. and </a:t>
+            </a:r>
+            <a:r>
+              <a:rPr lang="en-AU" sz="1200" dirty="0" err="1">
+                <a:effectLst/>
+              </a:rPr>
+              <a:t>Gotlib</a:t>
+            </a:r>
+            <a:r>
+              <a:rPr lang="en-AU" sz="1200" dirty="0">
+                <a:effectLst/>
+              </a:rPr>
+              <a:t>, Y. (2019) </a:t>
+            </a:r>
+            <a:r>
+              <a:rPr lang="en-AU" sz="1200" i="1" dirty="0">
+                <a:effectLst/>
+              </a:rPr>
+              <a:t>Inhibit system recovery</a:t>
+            </a:r>
+            <a:r>
+              <a:rPr lang="en-AU" sz="1200" dirty="0">
+                <a:effectLst/>
+              </a:rPr>
+              <a:t>, </a:t>
+            </a:r>
+            <a:r>
+              <a:rPr lang="en-AU" sz="1200" i="1" dirty="0">
+                <a:effectLst/>
+              </a:rPr>
+              <a:t>Inhibit System Recovery, Technique T1490 - Enterprise | MITRE ATT&amp;CK®</a:t>
+            </a:r>
+            <a:r>
+              <a:rPr lang="en-AU" sz="1200" dirty="0">
+                <a:effectLst/>
+              </a:rPr>
+              <a:t>. Available at: https://attack.mitre.org/techniques/T1490/ (Accessed: 22 September 2023). </a:t>
+            </a:r>
+          </a:p>
+          <a:p>
+            <a:r>
+              <a:rPr lang="en-AU" sz="1200" dirty="0">
+                <a:effectLst/>
+              </a:rPr>
+              <a:t>Intelligence, M.T. (2022) </a:t>
+            </a:r>
+            <a:r>
+              <a:rPr lang="en-AU" sz="1200" i="1" dirty="0">
+                <a:effectLst/>
+              </a:rPr>
+              <a:t>The many lives of </a:t>
+            </a:r>
+            <a:r>
+              <a:rPr lang="en-AU" sz="1200" i="1" dirty="0" err="1">
+                <a:effectLst/>
+              </a:rPr>
+              <a:t>BlackCat</a:t>
+            </a:r>
+            <a:r>
+              <a:rPr lang="en-AU" sz="1200" i="1" dirty="0">
+                <a:effectLst/>
+              </a:rPr>
+              <a:t> ransomware</a:t>
+            </a:r>
+            <a:r>
+              <a:rPr lang="en-AU" sz="1200" dirty="0">
+                <a:effectLst/>
+              </a:rPr>
+              <a:t>, </a:t>
+            </a:r>
+            <a:r>
+              <a:rPr lang="en-AU" sz="1200" i="1" dirty="0">
+                <a:effectLst/>
+              </a:rPr>
+              <a:t>Microsoft Security Blog</a:t>
+            </a:r>
+            <a:r>
+              <a:rPr lang="en-AU" sz="1200" dirty="0">
+                <a:effectLst/>
+              </a:rPr>
+              <a:t>. Available at: https://www.microsoft.com/en-us/security/blog/2022/06/13/the-many-lives-of-blackcat-ransomware/ (Accessed: 22 September 2023). </a:t>
+            </a:r>
+          </a:p>
+          <a:p>
+            <a:r>
+              <a:rPr lang="en-AU" sz="1200" dirty="0" err="1">
+                <a:effectLst/>
+              </a:rPr>
+              <a:t>Nagahama</a:t>
+            </a:r>
+            <a:r>
+              <a:rPr lang="en-AU" sz="1200" dirty="0">
+                <a:effectLst/>
+              </a:rPr>
+              <a:t>, H. </a:t>
+            </a:r>
+            <a:r>
+              <a:rPr lang="en-AU" sz="1200" i="1" dirty="0">
+                <a:effectLst/>
+              </a:rPr>
+              <a:t>et al.</a:t>
+            </a:r>
+            <a:r>
+              <a:rPr lang="en-AU" sz="1200" dirty="0">
+                <a:effectLst/>
+              </a:rPr>
+              <a:t> (2023) </a:t>
+            </a:r>
+            <a:r>
+              <a:rPr lang="en-AU" sz="1200" i="1" dirty="0">
+                <a:effectLst/>
+              </a:rPr>
+              <a:t>Blackcat</a:t>
+            </a:r>
+            <a:r>
+              <a:rPr lang="en-AU" sz="1200" dirty="0">
+                <a:effectLst/>
+              </a:rPr>
+              <a:t>, </a:t>
+            </a:r>
+            <a:r>
+              <a:rPr lang="en-AU" sz="1200" i="1" dirty="0" err="1">
+                <a:effectLst/>
+              </a:rPr>
+              <a:t>BlackCat</a:t>
+            </a:r>
+            <a:r>
+              <a:rPr lang="en-AU" sz="1200" i="1" dirty="0">
+                <a:effectLst/>
+              </a:rPr>
+              <a:t>, Software S1068 | MITRE ATT&amp;CK®</a:t>
+            </a:r>
+            <a:r>
+              <a:rPr lang="en-AU" sz="1200" dirty="0">
+                <a:effectLst/>
+              </a:rPr>
+              <a:t>. Available at: https://attack.mitre.org/software/S1068/ (Accessed: 22 September 2023). </a:t>
+            </a:r>
+          </a:p>
+          <a:p>
+            <a:r>
+              <a:rPr lang="en-AU" sz="1200" dirty="0">
+                <a:effectLst/>
+              </a:rPr>
+              <a:t>T1033, A.R. (2023) </a:t>
+            </a:r>
+            <a:r>
+              <a:rPr lang="en-AU" sz="1200" i="1" dirty="0">
+                <a:effectLst/>
+              </a:rPr>
+              <a:t>T1033</a:t>
+            </a:r>
+            <a:r>
+              <a:rPr lang="en-AU" sz="1200" dirty="0">
+                <a:effectLst/>
+              </a:rPr>
+              <a:t>, </a:t>
+            </a:r>
+            <a:r>
+              <a:rPr lang="en-AU" sz="1200" i="1" dirty="0">
+                <a:effectLst/>
+              </a:rPr>
+              <a:t>Explore Atomic Red Team</a:t>
+            </a:r>
+            <a:r>
+              <a:rPr lang="en-AU" sz="1200" dirty="0">
+                <a:effectLst/>
+              </a:rPr>
+              <a:t>. Available at: https://atomicredteam.io/discovery/T1033/ (Accessed: 22 September 2023). </a:t>
+            </a:r>
+          </a:p>
+          <a:p>
+            <a:r>
+              <a:rPr lang="en-AU" sz="1200" dirty="0">
+                <a:effectLst/>
+              </a:rPr>
+              <a:t>T1083, A. (2023) </a:t>
+            </a:r>
+            <a:r>
+              <a:rPr lang="en-AU" sz="1200" i="1" dirty="0">
+                <a:effectLst/>
+              </a:rPr>
+              <a:t>T1083</a:t>
+            </a:r>
+            <a:r>
+              <a:rPr lang="en-AU" sz="1200" dirty="0">
+                <a:effectLst/>
+              </a:rPr>
+              <a:t>, </a:t>
+            </a:r>
+            <a:r>
+              <a:rPr lang="en-AU" sz="1200" i="1" dirty="0">
+                <a:effectLst/>
+              </a:rPr>
+              <a:t>Explore Atomic Red Team</a:t>
+            </a:r>
+            <a:r>
+              <a:rPr lang="en-AU" sz="1200" dirty="0">
+                <a:effectLst/>
+              </a:rPr>
+              <a:t>. Available at: https://atomicredteam.io/discovery/T1083/ (Accessed: 22 September 2023). </a:t>
+            </a:r>
+          </a:p>
+        </p:txBody>
+      </p:sp>
+    </p:spTree>
+    <p:extLst>
+      <p:ext uri="{BB962C8B-B14F-4D97-AF65-F5344CB8AC3E}">
+        <p14:creationId xmlns:p14="http://schemas.microsoft.com/office/powerpoint/2010/main" val="3066845276"/>
+      </p:ext>
+    </p:extLst>
+  </p:cSld>
+  <p:clrMapOvr>
+    <a:masterClrMapping/>
+  </p:clrMapOvr>
+</p:sld>
+</file>
+
 <file path=ppt/slides/slide2.xml><?xml version="1.0" encoding="utf-8"?>
 <p:sld xmlns:a="http://schemas.openxmlformats.org/drawingml/2006/main" xmlns:r="http://schemas.openxmlformats.org/officeDocument/2006/relationships" xmlns:p="http://schemas.openxmlformats.org/presentationml/2006/main">
   <p:cSld>
@@ -5607,7 +5998,7 @@
           <p:cNvPr id="2" name="Title 1">
             <a:extLst>
               <a:ext uri="{FF2B5EF4-FFF2-40B4-BE49-F238E27FC236}">
-                <a16:creationId xmlns:a16="http://schemas.microsoft.com/office/drawing/2014/main" id="{E8BA4E43-19C5-02C9-ED26-8AF7FED21CED}"/>
+                <a16:creationId xmlns:a16="http://schemas.microsoft.com/office/drawing/2014/main" id="{1734740B-106F-2C9B-D680-A11926D801F9}"/>
               </a:ext>
             </a:extLst>
           </p:cNvPr>
@@ -5618,354 +6009,87 @@
             <p:ph type="title"/>
           </p:nvPr>
         </p:nvSpPr>
-        <p:spPr/>
+        <p:spPr>
+          <a:xfrm>
+            <a:off x="213049" y="-120067"/>
+            <a:ext cx="10515600" cy="1325563"/>
+          </a:xfrm>
+        </p:spPr>
         <p:txBody>
           <a:bodyPr/>
           <a:lstStyle/>
           <a:p>
             <a:r>
               <a:rPr lang="en-AU" dirty="0"/>
-              <a:t>References</a:t>
-            </a:r>
-          </a:p>
-        </p:txBody>
-      </p:sp>
-      <p:sp>
-        <p:nvSpPr>
-          <p:cNvPr id="3" name="Content Placeholder 2">
-            <a:extLst>
-              <a:ext uri="{FF2B5EF4-FFF2-40B4-BE49-F238E27FC236}">
-                <a16:creationId xmlns:a16="http://schemas.microsoft.com/office/drawing/2014/main" id="{B6A28169-F058-5AD3-E0C5-F60F9303105A}"/>
-              </a:ext>
-            </a:extLst>
-          </p:cNvPr>
-          <p:cNvSpPr>
-            <a:spLocks noGrp="1"/>
-          </p:cNvSpPr>
-          <p:nvPr>
-            <p:ph idx="1"/>
-          </p:nvPr>
-        </p:nvSpPr>
-        <p:spPr/>
-        <p:txBody>
-          <a:bodyPr>
-            <a:normAutofit/>
-          </a:bodyPr>
-          <a:lstStyle/>
-          <a:p>
-            <a:r>
-              <a:rPr lang="en-AU" sz="1200" dirty="0">
-                <a:effectLst/>
-              </a:rPr>
-              <a:t>ALPHV/</a:t>
-            </a:r>
-            <a:r>
-              <a:rPr lang="en-AU" sz="1200" dirty="0" err="1">
-                <a:effectLst/>
-              </a:rPr>
-              <a:t>BlackCat</a:t>
-            </a:r>
-            <a:r>
-              <a:rPr lang="en-AU" sz="1200" dirty="0">
-                <a:effectLst/>
-              </a:rPr>
-              <a:t> Ransomware, A.D.D.I. (2023) </a:t>
-            </a:r>
-            <a:r>
-              <a:rPr lang="en-AU" sz="1200" i="1" dirty="0">
-                <a:effectLst/>
-              </a:rPr>
-              <a:t>A deep dive into ALPHV/</a:t>
-            </a:r>
-            <a:r>
-              <a:rPr lang="en-AU" sz="1200" i="1" dirty="0" err="1">
-                <a:effectLst/>
-              </a:rPr>
-              <a:t>BlackCat</a:t>
-            </a:r>
-            <a:r>
-              <a:rPr lang="en-AU" sz="1200" i="1" dirty="0">
-                <a:effectLst/>
-              </a:rPr>
-              <a:t> ransomware</a:t>
-            </a:r>
-            <a:r>
-              <a:rPr lang="en-AU" sz="1200" dirty="0">
-                <a:effectLst/>
-              </a:rPr>
-              <a:t>, </a:t>
-            </a:r>
-            <a:r>
-              <a:rPr lang="en-AU" sz="1200" i="1" dirty="0" err="1">
-                <a:effectLst/>
-              </a:rPr>
-              <a:t>SecurityScorecard</a:t>
-            </a:r>
-            <a:r>
-              <a:rPr lang="en-AU" sz="1200" dirty="0">
-                <a:effectLst/>
-              </a:rPr>
-              <a:t>. Available at: https://securityscorecard.com/research/deep-dive-into-alphv-blackcat-ransomware/ (Accessed: 22 September 2023). </a:t>
-            </a:r>
-          </a:p>
-          <a:p>
-            <a:r>
-              <a:rPr lang="en-AU" sz="1200" dirty="0" err="1">
-                <a:effectLst/>
-              </a:rPr>
-              <a:t>Bouchrika</a:t>
-            </a:r>
-            <a:r>
-              <a:rPr lang="en-AU" sz="1200" dirty="0">
-                <a:effectLst/>
-              </a:rPr>
-              <a:t>, I. (2023) </a:t>
-            </a:r>
-            <a:r>
-              <a:rPr lang="en-AU" sz="1200" i="1" dirty="0" err="1">
-                <a:effectLst/>
-              </a:rPr>
-              <a:t>BlackCat</a:t>
-            </a:r>
-            <a:r>
-              <a:rPr lang="en-AU" sz="1200" i="1" dirty="0">
-                <a:effectLst/>
-              </a:rPr>
-              <a:t> ransomware (ALPHV)</a:t>
-            </a:r>
-            <a:r>
-              <a:rPr lang="en-AU" sz="1200" dirty="0">
-                <a:effectLst/>
-              </a:rPr>
-              <a:t>, </a:t>
-            </a:r>
-            <a:r>
-              <a:rPr lang="en-AU" sz="1200" i="1" dirty="0">
-                <a:effectLst/>
-              </a:rPr>
-              <a:t>Varonis</a:t>
-            </a:r>
-            <a:r>
-              <a:rPr lang="en-AU" sz="1200" dirty="0">
-                <a:effectLst/>
-              </a:rPr>
-              <a:t>. Available at: https://www.varonis.com/blog/blackcat-ransomware (Accessed: 22 September 2023). </a:t>
-            </a:r>
-          </a:p>
-          <a:p>
-            <a:r>
-              <a:rPr lang="en-AU" sz="1200" dirty="0">
-                <a:effectLst/>
-              </a:rPr>
-              <a:t>Clark, A., Sivakumaran, P. and </a:t>
-            </a:r>
-            <a:r>
-              <a:rPr lang="en-AU" sz="1200" dirty="0" err="1">
-                <a:effectLst/>
-              </a:rPr>
-              <a:t>Gotlib</a:t>
-            </a:r>
-            <a:r>
-              <a:rPr lang="en-AU" sz="1200" dirty="0">
-                <a:effectLst/>
-              </a:rPr>
-              <a:t>, Y. (2019) </a:t>
-            </a:r>
-            <a:r>
-              <a:rPr lang="en-AU" sz="1200" i="1" dirty="0">
-                <a:effectLst/>
-              </a:rPr>
-              <a:t>Inhibit system recovery</a:t>
-            </a:r>
-            <a:r>
-              <a:rPr lang="en-AU" sz="1200" dirty="0">
-                <a:effectLst/>
-              </a:rPr>
-              <a:t>, </a:t>
-            </a:r>
-            <a:r>
-              <a:rPr lang="en-AU" sz="1200" i="1" dirty="0">
-                <a:effectLst/>
-              </a:rPr>
-              <a:t>Inhibit System Recovery, Technique T1490 - Enterprise | MITRE ATT&amp;CK®</a:t>
-            </a:r>
-            <a:r>
-              <a:rPr lang="en-AU" sz="1200" dirty="0">
-                <a:effectLst/>
-              </a:rPr>
-              <a:t>. Available at: https://attack.mitre.org/techniques/T1490/ (Accessed: 22 September 2023). </a:t>
-            </a:r>
-          </a:p>
-          <a:p>
-            <a:r>
-              <a:rPr lang="en-AU" sz="1200" dirty="0">
-                <a:effectLst/>
-              </a:rPr>
-              <a:t>Intelligence, M.T. (2022) </a:t>
-            </a:r>
-            <a:r>
-              <a:rPr lang="en-AU" sz="1200" i="1" dirty="0">
-                <a:effectLst/>
-              </a:rPr>
-              <a:t>The many lives of </a:t>
-            </a:r>
-            <a:r>
-              <a:rPr lang="en-AU" sz="1200" i="1" dirty="0" err="1">
-                <a:effectLst/>
-              </a:rPr>
-              <a:t>BlackCat</a:t>
-            </a:r>
-            <a:r>
-              <a:rPr lang="en-AU" sz="1200" i="1" dirty="0">
-                <a:effectLst/>
-              </a:rPr>
-              <a:t> ransomware</a:t>
-            </a:r>
-            <a:r>
-              <a:rPr lang="en-AU" sz="1200" dirty="0">
-                <a:effectLst/>
-              </a:rPr>
-              <a:t>, </a:t>
-            </a:r>
-            <a:r>
-              <a:rPr lang="en-AU" sz="1200" i="1" dirty="0">
-                <a:effectLst/>
-              </a:rPr>
-              <a:t>Microsoft Security Blog</a:t>
-            </a:r>
-            <a:r>
-              <a:rPr lang="en-AU" sz="1200" dirty="0">
-                <a:effectLst/>
-              </a:rPr>
-              <a:t>. Available at: https://www.microsoft.com/en-us/security/blog/2022/06/13/the-many-lives-of-blackcat-ransomware/ (Accessed: 22 September 2023). </a:t>
-            </a:r>
-          </a:p>
-          <a:p>
-            <a:r>
-              <a:rPr lang="en-AU" sz="1200" dirty="0" err="1">
-                <a:effectLst/>
-              </a:rPr>
-              <a:t>Nagahama</a:t>
-            </a:r>
-            <a:r>
-              <a:rPr lang="en-AU" sz="1200" dirty="0">
-                <a:effectLst/>
-              </a:rPr>
-              <a:t>, H. </a:t>
-            </a:r>
-            <a:r>
-              <a:rPr lang="en-AU" sz="1200" i="1" dirty="0">
-                <a:effectLst/>
-              </a:rPr>
-              <a:t>et al.</a:t>
-            </a:r>
-            <a:r>
-              <a:rPr lang="en-AU" sz="1200" dirty="0">
-                <a:effectLst/>
-              </a:rPr>
-              <a:t> (2023) </a:t>
-            </a:r>
-            <a:r>
-              <a:rPr lang="en-AU" sz="1200" i="1" dirty="0">
-                <a:effectLst/>
-              </a:rPr>
-              <a:t>Blackcat</a:t>
-            </a:r>
-            <a:r>
-              <a:rPr lang="en-AU" sz="1200" dirty="0">
-                <a:effectLst/>
-              </a:rPr>
-              <a:t>, </a:t>
-            </a:r>
-            <a:r>
-              <a:rPr lang="en-AU" sz="1200" i="1" dirty="0" err="1">
-                <a:effectLst/>
-              </a:rPr>
-              <a:t>BlackCat</a:t>
-            </a:r>
-            <a:r>
-              <a:rPr lang="en-AU" sz="1200" i="1" dirty="0">
-                <a:effectLst/>
-              </a:rPr>
-              <a:t>, Software S1068 | MITRE ATT&amp;CK®</a:t>
-            </a:r>
-            <a:r>
-              <a:rPr lang="en-AU" sz="1200" dirty="0">
-                <a:effectLst/>
-              </a:rPr>
-              <a:t>. Available at: https://attack.mitre.org/software/S1068/ (Accessed: 22 September 2023). </a:t>
-            </a:r>
-          </a:p>
-          <a:p>
-            <a:r>
-              <a:rPr lang="en-AU" sz="1200" dirty="0">
-                <a:effectLst/>
-              </a:rPr>
-              <a:t>T1033, A.R. (2023) </a:t>
-            </a:r>
-            <a:r>
-              <a:rPr lang="en-AU" sz="1200" i="1" dirty="0">
-                <a:effectLst/>
-              </a:rPr>
-              <a:t>T1033</a:t>
-            </a:r>
-            <a:r>
-              <a:rPr lang="en-AU" sz="1200" dirty="0">
-                <a:effectLst/>
-              </a:rPr>
-              <a:t>, </a:t>
-            </a:r>
-            <a:r>
-              <a:rPr lang="en-AU" sz="1200" i="1" dirty="0">
-                <a:effectLst/>
-              </a:rPr>
-              <a:t>Explore Atomic Red Team</a:t>
-            </a:r>
-            <a:r>
-              <a:rPr lang="en-AU" sz="1200" dirty="0">
-                <a:effectLst/>
-              </a:rPr>
-              <a:t>. Available at: https://atomicredteam.io/discovery/T1033/ (Accessed: 22 September 2023). </a:t>
-            </a:r>
-          </a:p>
-          <a:p>
-            <a:r>
-              <a:rPr lang="en-AU" sz="1200" dirty="0">
-                <a:effectLst/>
-              </a:rPr>
-              <a:t>T1083, A. (2023) </a:t>
-            </a:r>
-            <a:r>
-              <a:rPr lang="en-AU" sz="1200" i="1" dirty="0">
-                <a:effectLst/>
-              </a:rPr>
-              <a:t>T1083</a:t>
-            </a:r>
-            <a:r>
-              <a:rPr lang="en-AU" sz="1200" dirty="0">
-                <a:effectLst/>
-              </a:rPr>
-              <a:t>, </a:t>
-            </a:r>
-            <a:r>
-              <a:rPr lang="en-AU" sz="1200" i="1" dirty="0">
-                <a:effectLst/>
-              </a:rPr>
-              <a:t>Explore Atomic Red Team</a:t>
-            </a:r>
-            <a:r>
-              <a:rPr lang="en-AU" sz="1200" dirty="0">
-                <a:effectLst/>
-              </a:rPr>
-              <a:t>. Available at: https://atomicredteam.io/discovery/T1083/ (Accessed: 22 September 2023). </a:t>
-            </a:r>
-          </a:p>
-        </p:txBody>
-      </p:sp>
+              <a:t>Testing attack script</a:t>
+            </a:r>
+          </a:p>
+        </p:txBody>
+      </p:sp>
+      <p:pic>
+        <p:nvPicPr>
+          <p:cNvPr id="5" name="Picture 4">
+            <a:extLst>
+              <a:ext uri="{FF2B5EF4-FFF2-40B4-BE49-F238E27FC236}">
+                <a16:creationId xmlns:a16="http://schemas.microsoft.com/office/drawing/2014/main" id="{B0031B03-2D17-9ABF-8927-1E2211522140}"/>
+              </a:ext>
+            </a:extLst>
+          </p:cNvPr>
+          <p:cNvPicPr>
+            <a:picLocks noChangeAspect="1"/>
+          </p:cNvPicPr>
+          <p:nvPr/>
+        </p:nvPicPr>
+        <p:blipFill>
+          <a:blip r:embed="rId2"/>
+          <a:stretch>
+            <a:fillRect/>
+          </a:stretch>
+        </p:blipFill>
+        <p:spPr>
+          <a:xfrm>
+            <a:off x="0" y="4482123"/>
+            <a:ext cx="12192000" cy="2375877"/>
+          </a:xfrm>
+          <a:prstGeom prst="rect">
+            <a:avLst/>
+          </a:prstGeom>
+        </p:spPr>
+      </p:pic>
+      <p:pic>
+        <p:nvPicPr>
+          <p:cNvPr id="7" name="Picture 6">
+            <a:extLst>
+              <a:ext uri="{FF2B5EF4-FFF2-40B4-BE49-F238E27FC236}">
+                <a16:creationId xmlns:a16="http://schemas.microsoft.com/office/drawing/2014/main" id="{F57ABF64-3B6D-E6F5-D0BF-365174084BBF}"/>
+              </a:ext>
+            </a:extLst>
+          </p:cNvPr>
+          <p:cNvPicPr>
+            <a:picLocks noChangeAspect="1"/>
+          </p:cNvPicPr>
+          <p:nvPr/>
+        </p:nvPicPr>
+        <p:blipFill>
+          <a:blip r:embed="rId3"/>
+          <a:stretch>
+            <a:fillRect/>
+          </a:stretch>
+        </p:blipFill>
+        <p:spPr>
+          <a:xfrm>
+            <a:off x="5048250" y="233973"/>
+            <a:ext cx="7143750" cy="4248150"/>
+          </a:xfrm>
+          <a:prstGeom prst="rect">
+            <a:avLst/>
+          </a:prstGeom>
+        </p:spPr>
+      </p:pic>
     </p:spTree>
     <p:extLst>
       <p:ext uri="{BB962C8B-B14F-4D97-AF65-F5344CB8AC3E}">
-        <p14:creationId xmlns:p14="http://schemas.microsoft.com/office/powerpoint/2010/main" val="3066845276"/>
+        <p14:creationId xmlns:p14="http://schemas.microsoft.com/office/powerpoint/2010/main" val="3030645413"/>
       </p:ext>
     </p:extLst>
   </p:cSld>

</xml_diff>